<commit_message>
Updated lectures and HW 1
</commit_message>
<xml_diff>
--- a/classes/winter_2023/lectures/lecture_06-building-closed-loop-testbed/building_closed_loop_testbed.pptx
+++ b/classes/winter_2023/lectures/lecture_06-building-closed-loop-testbed/building_closed_loop_testbed.pptx
@@ -5,7 +5,7 @@
     <p:sldMasterId id="2147483648" r:id="rId1"/>
   </p:sldMasterIdLst>
   <p:notesMasterIdLst>
-    <p:notesMasterId r:id="rId8"/>
+    <p:notesMasterId r:id="rId10"/>
   </p:notesMasterIdLst>
   <p:sldIdLst>
     <p:sldId id="256" r:id="rId2"/>
@@ -14,20 +14,22 @@
     <p:sldId id="533" r:id="rId5"/>
     <p:sldId id="534" r:id="rId6"/>
     <p:sldId id="535" r:id="rId7"/>
+    <p:sldId id="536" r:id="rId8"/>
+    <p:sldId id="537" r:id="rId9"/>
   </p:sldIdLst>
   <p:sldSz cx="9144000" cy="6858000" type="screen4x3"/>
   <p:notesSz cx="6858000" cy="9144000"/>
   <p:embeddedFontLst>
     <p:embeddedFont>
       <p:font typeface="Calibri" panose="020F0502020204030204" pitchFamily="34" charset="0"/>
-      <p:regular r:id="rId9"/>
-      <p:bold r:id="rId10"/>
-      <p:italic r:id="rId11"/>
-      <p:boldItalic r:id="rId12"/>
+      <p:regular r:id="rId11"/>
+      <p:bold r:id="rId12"/>
+      <p:italic r:id="rId13"/>
+      <p:boldItalic r:id="rId14"/>
     </p:embeddedFont>
     <p:embeddedFont>
       <p:font typeface="Cambria Math" panose="02040503050406030204" pitchFamily="18" charset="0"/>
-      <p:regular r:id="rId13"/>
+      <p:regular r:id="rId15"/>
     </p:embeddedFont>
   </p:embeddedFontLst>
   <p:defaultTextStyle>
@@ -1819,6 +1821,192 @@
     <p:extLst>
       <p:ext uri="{BB962C8B-B14F-4D97-AF65-F5344CB8AC3E}">
         <p14:creationId xmlns:p14="http://schemas.microsoft.com/office/powerpoint/2010/main" val="914129142"/>
+      </p:ext>
+    </p:extLst>
+  </p:cSld>
+  <p:clrMapOvr>
+    <a:masterClrMapping/>
+  </p:clrMapOvr>
+</p:notes>
+</file>
+
+<file path=ppt/notesSlides/notesSlide4.xml><?xml version="1.0" encoding="utf-8"?>
+<p:notes xmlns:a="http://schemas.openxmlformats.org/drawingml/2006/main" xmlns:r="http://schemas.openxmlformats.org/officeDocument/2006/relationships" xmlns:p="http://schemas.openxmlformats.org/presentationml/2006/main">
+  <p:cSld>
+    <p:spTree>
+      <p:nvGrpSpPr>
+        <p:cNvPr id="1" name=""/>
+        <p:cNvGrpSpPr/>
+        <p:nvPr/>
+      </p:nvGrpSpPr>
+      <p:grpSpPr>
+        <a:xfrm>
+          <a:off x="0" y="0"/>
+          <a:ext cx="0" cy="0"/>
+          <a:chOff x="0" y="0"/>
+          <a:chExt cx="0" cy="0"/>
+        </a:xfrm>
+      </p:grpSpPr>
+      <p:sp>
+        <p:nvSpPr>
+          <p:cNvPr id="2" name="Slide Image Placeholder 1"/>
+          <p:cNvSpPr>
+            <a:spLocks noGrp="1" noRot="1" noChangeAspect="1"/>
+          </p:cNvSpPr>
+          <p:nvPr>
+            <p:ph type="sldImg"/>
+          </p:nvPr>
+        </p:nvSpPr>
+        <p:spPr/>
+      </p:sp>
+      <p:sp>
+        <p:nvSpPr>
+          <p:cNvPr id="3" name="Notes Placeholder 2"/>
+          <p:cNvSpPr>
+            <a:spLocks noGrp="1"/>
+          </p:cNvSpPr>
+          <p:nvPr>
+            <p:ph type="body" idx="1"/>
+          </p:nvPr>
+        </p:nvSpPr>
+        <p:spPr/>
+        <p:txBody>
+          <a:bodyPr/>
+          <a:lstStyle/>
+          <a:p>
+            <a:r>
+              <a:rPr lang="en-US" dirty="0"/>
+              <a:t>Why doesn’t a filter help with measurement noise? Verify transfer functions.</a:t>
+            </a:r>
+          </a:p>
+        </p:txBody>
+      </p:sp>
+      <p:sp>
+        <p:nvSpPr>
+          <p:cNvPr id="4" name="Slide Number Placeholder 3"/>
+          <p:cNvSpPr>
+            <a:spLocks noGrp="1"/>
+          </p:cNvSpPr>
+          <p:nvPr>
+            <p:ph type="sldNum" sz="quarter" idx="5"/>
+          </p:nvPr>
+        </p:nvSpPr>
+        <p:spPr/>
+        <p:txBody>
+          <a:bodyPr/>
+          <a:lstStyle/>
+          <a:p>
+            <a:pPr>
+              <a:defRPr/>
+            </a:pPr>
+            <a:fld id="{1E3608CA-DBCA-4E8F-8DAB-6E1AFAF19782}" type="slidenum">
+              <a:rPr lang="en-US" altLang="x-none" smtClean="0"/>
+              <a:pPr>
+                <a:defRPr/>
+              </a:pPr>
+              <a:t>7</a:t>
+            </a:fld>
+            <a:endParaRPr lang="en-US" altLang="x-none"/>
+          </a:p>
+        </p:txBody>
+      </p:sp>
+    </p:spTree>
+    <p:extLst>
+      <p:ext uri="{BB962C8B-B14F-4D97-AF65-F5344CB8AC3E}">
+        <p14:creationId xmlns:p14="http://schemas.microsoft.com/office/powerpoint/2010/main" val="1062475486"/>
+      </p:ext>
+    </p:extLst>
+  </p:cSld>
+  <p:clrMapOvr>
+    <a:masterClrMapping/>
+  </p:clrMapOvr>
+</p:notes>
+</file>
+
+<file path=ppt/notesSlides/notesSlide5.xml><?xml version="1.0" encoding="utf-8"?>
+<p:notes xmlns:a="http://schemas.openxmlformats.org/drawingml/2006/main" xmlns:r="http://schemas.openxmlformats.org/officeDocument/2006/relationships" xmlns:p="http://schemas.openxmlformats.org/presentationml/2006/main">
+  <p:cSld>
+    <p:spTree>
+      <p:nvGrpSpPr>
+        <p:cNvPr id="1" name=""/>
+        <p:cNvGrpSpPr/>
+        <p:nvPr/>
+      </p:nvGrpSpPr>
+      <p:grpSpPr>
+        <a:xfrm>
+          <a:off x="0" y="0"/>
+          <a:ext cx="0" cy="0"/>
+          <a:chOff x="0" y="0"/>
+          <a:chExt cx="0" cy="0"/>
+        </a:xfrm>
+      </p:grpSpPr>
+      <p:sp>
+        <p:nvSpPr>
+          <p:cNvPr id="2" name="Slide Image Placeholder 1"/>
+          <p:cNvSpPr>
+            <a:spLocks noGrp="1" noRot="1" noChangeAspect="1"/>
+          </p:cNvSpPr>
+          <p:nvPr>
+            <p:ph type="sldImg"/>
+          </p:nvPr>
+        </p:nvSpPr>
+        <p:spPr/>
+      </p:sp>
+      <p:sp>
+        <p:nvSpPr>
+          <p:cNvPr id="3" name="Notes Placeholder 2"/>
+          <p:cNvSpPr>
+            <a:spLocks noGrp="1"/>
+          </p:cNvSpPr>
+          <p:nvPr>
+            <p:ph type="body" idx="1"/>
+          </p:nvPr>
+        </p:nvSpPr>
+        <p:spPr/>
+        <p:txBody>
+          <a:bodyPr/>
+          <a:lstStyle/>
+          <a:p>
+            <a:r>
+              <a:rPr lang="en-US" dirty="0"/>
+              <a:t>Why doesn’t a filter help with measurement noise? Verify transfer functions.</a:t>
+            </a:r>
+          </a:p>
+        </p:txBody>
+      </p:sp>
+      <p:sp>
+        <p:nvSpPr>
+          <p:cNvPr id="4" name="Slide Number Placeholder 3"/>
+          <p:cNvSpPr>
+            <a:spLocks noGrp="1"/>
+          </p:cNvSpPr>
+          <p:nvPr>
+            <p:ph type="sldNum" sz="quarter" idx="5"/>
+          </p:nvPr>
+        </p:nvSpPr>
+        <p:spPr/>
+        <p:txBody>
+          <a:bodyPr/>
+          <a:lstStyle/>
+          <a:p>
+            <a:pPr>
+              <a:defRPr/>
+            </a:pPr>
+            <a:fld id="{1E3608CA-DBCA-4E8F-8DAB-6E1AFAF19782}" type="slidenum">
+              <a:rPr lang="en-US" altLang="x-none" smtClean="0"/>
+              <a:pPr>
+                <a:defRPr/>
+              </a:pPr>
+              <a:t>8</a:t>
+            </a:fld>
+            <a:endParaRPr lang="en-US" altLang="x-none"/>
+          </a:p>
+        </p:txBody>
+      </p:sp>
+    </p:spTree>
+    <p:extLst>
+      <p:ext uri="{BB962C8B-B14F-4D97-AF65-F5344CB8AC3E}">
+        <p14:creationId xmlns:p14="http://schemas.microsoft.com/office/powerpoint/2010/main" val="1445624436"/>
       </p:ext>
     </p:extLst>
   </p:cSld>
@@ -19522,6 +19710,577 @@
           <a:lstStyle/>
           <a:p>
             <a:pPr algn="ctr"/>
+            <a:endParaRPr lang="en-US" sz="1600" dirty="0">
+              <a:latin typeface="Courier New" panose="02070309020205020404" pitchFamily="49" charset="0"/>
+              <a:cs typeface="Courier New" panose="02070309020205020404" pitchFamily="49" charset="0"/>
+            </a:endParaRPr>
+          </a:p>
+          <a:p>
+            <a:pPr algn="ctr"/>
+            <a:r>
+              <a:rPr lang="en-US" sz="1600" dirty="0">
+                <a:latin typeface="Courier New" panose="02070309020205020404" pitchFamily="49" charset="0"/>
+                <a:cs typeface="Courier New" panose="02070309020205020404" pitchFamily="49" charset="0"/>
+              </a:rPr>
+              <a:t>controller</a:t>
+            </a:r>
+          </a:p>
+        </p:txBody>
+      </p:sp>
+      <p:sp>
+        <p:nvSpPr>
+          <p:cNvPr id="51" name="Rectangle 50">
+            <a:extLst>
+              <a:ext uri="{FF2B5EF4-FFF2-40B4-BE49-F238E27FC236}">
+                <a16:creationId xmlns:a16="http://schemas.microsoft.com/office/drawing/2014/main" id="{5C0CC0A4-47F0-7849-B0ED-5689BEABB267}"/>
+              </a:ext>
+            </a:extLst>
+          </p:cNvPr>
+          <p:cNvSpPr/>
+          <p:nvPr/>
+        </p:nvSpPr>
+        <p:spPr>
+          <a:xfrm>
+            <a:off x="2999134" y="1884767"/>
+            <a:ext cx="1066318" cy="253916"/>
+          </a:xfrm>
+          <a:prstGeom prst="rect">
+            <a:avLst/>
+          </a:prstGeom>
+        </p:spPr>
+        <p:txBody>
+          <a:bodyPr wrap="none">
+            <a:spAutoFit/>
+          </a:bodyPr>
+          <a:lstStyle/>
+          <a:p>
+            <a:pPr/>
+            <a:r>
+              <a:rPr lang="en-US" sz="1050" dirty="0">
+                <a:solidFill>
+                  <a:schemeClr val="bg1"/>
+                </a:solidFill>
+                <a:latin typeface="Courier New" panose="02070309020205020404" pitchFamily="49" charset="0"/>
+                <a:cs typeface="Courier New" panose="02070309020205020404" pitchFamily="49" charset="0"/>
+              </a:rPr>
+              <a:t>S5_SETPOINT</a:t>
+            </a:r>
+          </a:p>
+        </p:txBody>
+      </p:sp>
+      <p:sp>
+        <p:nvSpPr>
+          <p:cNvPr id="57" name="Rectangle 56">
+            <a:extLst>
+              <a:ext uri="{FF2B5EF4-FFF2-40B4-BE49-F238E27FC236}">
+                <a16:creationId xmlns:a16="http://schemas.microsoft.com/office/drawing/2014/main" id="{AF2E63ED-93E9-E543-AE7E-ECFC6DD54B4B}"/>
+              </a:ext>
+            </a:extLst>
+          </p:cNvPr>
+          <p:cNvSpPr/>
+          <p:nvPr/>
+        </p:nvSpPr>
+        <p:spPr>
+          <a:xfrm>
+            <a:off x="6556947" y="1715490"/>
+            <a:ext cx="451979" cy="338554"/>
+          </a:xfrm>
+          <a:prstGeom prst="rect">
+            <a:avLst/>
+          </a:prstGeom>
+        </p:spPr>
+        <p:txBody>
+          <a:bodyPr wrap="square">
+            <a:spAutoFit/>
+          </a:bodyPr>
+          <a:lstStyle/>
+          <a:p>
+            <a:pPr/>
+            <a:r>
+              <a:rPr lang="en-US" sz="1600" dirty="0">
+                <a:solidFill>
+                  <a:schemeClr val="tx1"/>
+                </a:solidFill>
+                <a:latin typeface="Courier New" panose="02070309020205020404" pitchFamily="49" charset="0"/>
+                <a:cs typeface="Courier New" panose="02070309020205020404" pitchFamily="49" charset="0"/>
+              </a:rPr>
+              <a:t>s5</a:t>
+            </a:r>
+          </a:p>
+        </p:txBody>
+      </p:sp>
+      <p:sp>
+        <p:nvSpPr>
+          <p:cNvPr id="58" name="Oval 57">
+            <a:extLst>
+              <a:ext uri="{FF2B5EF4-FFF2-40B4-BE49-F238E27FC236}">
+                <a16:creationId xmlns:a16="http://schemas.microsoft.com/office/drawing/2014/main" id="{663E4834-183D-824E-BFDF-4BEF73BB9D53}"/>
+              </a:ext>
+            </a:extLst>
+          </p:cNvPr>
+          <p:cNvSpPr>
+            <a:spLocks/>
+          </p:cNvSpPr>
+          <p:nvPr/>
+        </p:nvSpPr>
+        <p:spPr>
+          <a:xfrm>
+            <a:off x="6828692" y="2137413"/>
+            <a:ext cx="180234" cy="182880"/>
+          </a:xfrm>
+          <a:prstGeom prst="ellipse">
+            <a:avLst/>
+          </a:prstGeom>
+        </p:spPr>
+        <p:style>
+          <a:lnRef idx="1">
+            <a:schemeClr val="accent1"/>
+          </a:lnRef>
+          <a:fillRef idx="3">
+            <a:schemeClr val="accent1"/>
+          </a:fillRef>
+          <a:effectRef idx="2">
+            <a:schemeClr val="accent1"/>
+          </a:effectRef>
+          <a:fontRef idx="minor">
+            <a:schemeClr val="lt1"/>
+          </a:fontRef>
+        </p:style>
+        <p:txBody>
+          <a:bodyPr rtlCol="0" anchor="ctr"/>
+          <a:lstStyle/>
+          <a:p>
+            <a:pPr algn="ctr"/>
+            <a:endParaRPr lang="en-US" dirty="0"/>
+          </a:p>
+        </p:txBody>
+      </p:sp>
+      <p:cxnSp>
+        <p:nvCxnSpPr>
+          <p:cNvPr id="59" name="Straight Arrow Connector 58">
+            <a:extLst>
+              <a:ext uri="{FF2B5EF4-FFF2-40B4-BE49-F238E27FC236}">
+                <a16:creationId xmlns:a16="http://schemas.microsoft.com/office/drawing/2014/main" id="{05D7142B-DF18-474D-A65D-D0A0FA353A05}"/>
+              </a:ext>
+            </a:extLst>
+          </p:cNvPr>
+          <p:cNvCxnSpPr>
+            <a:cxnSpLocks/>
+            <a:stCxn id="58" idx="6"/>
+          </p:cNvCxnSpPr>
+          <p:nvPr/>
+        </p:nvCxnSpPr>
+        <p:spPr>
+          <a:xfrm flipV="1">
+            <a:off x="7008926" y="2227603"/>
+            <a:ext cx="705285" cy="1250"/>
+          </a:xfrm>
+          <a:prstGeom prst="straightConnector1">
+            <a:avLst/>
+          </a:prstGeom>
+          <a:ln>
+            <a:tailEnd type="triangle" w="lg" len="lg"/>
+          </a:ln>
+          <a:effectLst>
+            <a:outerShdw dist="20000" sx="1000" sy="1000" rotWithShape="0">
+              <a:srgbClr val="000000"/>
+            </a:outerShdw>
+          </a:effectLst>
+        </p:spPr>
+        <p:style>
+          <a:lnRef idx="2">
+            <a:schemeClr val="accent1"/>
+          </a:lnRef>
+          <a:fillRef idx="0">
+            <a:schemeClr val="accent1"/>
+          </a:fillRef>
+          <a:effectRef idx="1">
+            <a:schemeClr val="accent1"/>
+          </a:effectRef>
+          <a:fontRef idx="minor">
+            <a:schemeClr val="tx1"/>
+          </a:fontRef>
+        </p:style>
+      </p:cxnSp>
+      <p:cxnSp>
+        <p:nvCxnSpPr>
+          <p:cNvPr id="64" name="Elbow Connector 63">
+            <a:extLst>
+              <a:ext uri="{FF2B5EF4-FFF2-40B4-BE49-F238E27FC236}">
+                <a16:creationId xmlns:a16="http://schemas.microsoft.com/office/drawing/2014/main" id="{320150CC-EEFB-1346-9D45-02D18A784683}"/>
+              </a:ext>
+            </a:extLst>
+          </p:cNvPr>
+          <p:cNvCxnSpPr>
+            <a:cxnSpLocks/>
+            <a:stCxn id="58" idx="4"/>
+            <a:endCxn id="45" idx="1"/>
+          </p:cNvCxnSpPr>
+          <p:nvPr/>
+        </p:nvCxnSpPr>
+        <p:spPr>
+          <a:xfrm rot="5400000" flipH="1">
+            <a:off x="4926645" y="328129"/>
+            <a:ext cx="92690" cy="3891639"/>
+          </a:xfrm>
+          <a:prstGeom prst="bentConnector4">
+            <a:avLst>
+              <a:gd name="adj1" fmla="val -489141"/>
+              <a:gd name="adj2" fmla="val 105874"/>
+            </a:avLst>
+          </a:prstGeom>
+          <a:ln w="19050">
+            <a:tailEnd type="triangle" w="lg" len="lg"/>
+          </a:ln>
+          <a:effectLst>
+            <a:outerShdw dist="20000" sx="1000" sy="1000" rotWithShape="0">
+              <a:srgbClr val="000000"/>
+            </a:outerShdw>
+          </a:effectLst>
+        </p:spPr>
+        <p:style>
+          <a:lnRef idx="2">
+            <a:schemeClr val="accent1"/>
+          </a:lnRef>
+          <a:fillRef idx="0">
+            <a:schemeClr val="accent1"/>
+          </a:fillRef>
+          <a:effectRef idx="1">
+            <a:schemeClr val="accent1"/>
+          </a:effectRef>
+          <a:fontRef idx="minor">
+            <a:schemeClr val="tx1"/>
+          </a:fontRef>
+        </p:style>
+      </p:cxnSp>
+      <p:sp>
+        <p:nvSpPr>
+          <p:cNvPr id="13" name="Rectangle 12">
+            <a:extLst>
+              <a:ext uri="{FF2B5EF4-FFF2-40B4-BE49-F238E27FC236}">
+                <a16:creationId xmlns:a16="http://schemas.microsoft.com/office/drawing/2014/main" id="{438C790D-DFB5-6AD2-4622-E90103AE9B48}"/>
+              </a:ext>
+            </a:extLst>
+          </p:cNvPr>
+          <p:cNvSpPr/>
+          <p:nvPr/>
+        </p:nvSpPr>
+        <p:spPr>
+          <a:xfrm>
+            <a:off x="4799391" y="1796255"/>
+            <a:ext cx="451979" cy="338554"/>
+          </a:xfrm>
+          <a:prstGeom prst="rect">
+            <a:avLst/>
+          </a:prstGeom>
+        </p:spPr>
+        <p:txBody>
+          <a:bodyPr wrap="square">
+            <a:spAutoFit/>
+          </a:bodyPr>
+          <a:lstStyle/>
+          <a:p>
+            <a:pPr/>
+            <a:r>
+              <a:rPr lang="en-US" sz="1600" dirty="0">
+                <a:solidFill>
+                  <a:schemeClr val="tx1"/>
+                </a:solidFill>
+                <a:latin typeface="Courier New" panose="02070309020205020404" pitchFamily="49" charset="0"/>
+                <a:cs typeface="Courier New" panose="02070309020205020404" pitchFamily="49" charset="0"/>
+              </a:rPr>
+              <a:t>at</a:t>
+            </a:r>
+          </a:p>
+        </p:txBody>
+      </p:sp>
+    </p:spTree>
+    <p:extLst>
+      <p:ext uri="{BB962C8B-B14F-4D97-AF65-F5344CB8AC3E}">
+        <p14:creationId xmlns:p14="http://schemas.microsoft.com/office/powerpoint/2010/main" val="225109070"/>
+      </p:ext>
+    </p:extLst>
+  </p:cSld>
+  <p:clrMapOvr>
+    <a:masterClrMapping/>
+  </p:clrMapOvr>
+</p:sld>
+</file>
+
+<file path=ppt/slides/slide7.xml><?xml version="1.0" encoding="utf-8"?>
+<p:sld xmlns:a="http://schemas.openxmlformats.org/drawingml/2006/main" xmlns:r="http://schemas.openxmlformats.org/officeDocument/2006/relationships" xmlns:p="http://schemas.openxmlformats.org/presentationml/2006/main">
+  <p:cSld>
+    <p:spTree>
+      <p:nvGrpSpPr>
+        <p:cNvPr id="1" name=""/>
+        <p:cNvGrpSpPr/>
+        <p:nvPr/>
+      </p:nvGrpSpPr>
+      <p:grpSpPr>
+        <a:xfrm>
+          <a:off x="0" y="0"/>
+          <a:ext cx="0" cy="0"/>
+          <a:chOff x="0" y="0"/>
+          <a:chExt cx="0" cy="0"/>
+        </a:xfrm>
+      </p:grpSpPr>
+      <p:sp>
+        <p:nvSpPr>
+          <p:cNvPr id="2" name="Title 1">
+            <a:extLst>
+              <a:ext uri="{FF2B5EF4-FFF2-40B4-BE49-F238E27FC236}">
+                <a16:creationId xmlns:a16="http://schemas.microsoft.com/office/drawing/2014/main" id="{6CF811BA-8C43-DB43-9A58-7F630C6185FD}"/>
+              </a:ext>
+            </a:extLst>
+          </p:cNvPr>
+          <p:cNvSpPr>
+            <a:spLocks noGrp="1"/>
+          </p:cNvSpPr>
+          <p:nvPr>
+            <p:ph type="title"/>
+          </p:nvPr>
+        </p:nvSpPr>
+        <p:spPr/>
+        <p:txBody>
+          <a:bodyPr/>
+          <a:lstStyle/>
+          <a:p>
+            <a:r>
+              <a:rPr lang="en-US" dirty="0"/>
+              <a:t>Wolf Closed Loop System</a:t>
+            </a:r>
+          </a:p>
+        </p:txBody>
+      </p:sp>
+      <p:sp>
+        <p:nvSpPr>
+          <p:cNvPr id="3" name="Slide Number Placeholder 2">
+            <a:extLst>
+              <a:ext uri="{FF2B5EF4-FFF2-40B4-BE49-F238E27FC236}">
+                <a16:creationId xmlns:a16="http://schemas.microsoft.com/office/drawing/2014/main" id="{BF0E0FF1-290E-6F42-9F42-6FFE9B7272B7}"/>
+              </a:ext>
+            </a:extLst>
+          </p:cNvPr>
+          <p:cNvSpPr>
+            <a:spLocks noGrp="1"/>
+          </p:cNvSpPr>
+          <p:nvPr>
+            <p:ph type="sldNum" sz="quarter" idx="11"/>
+          </p:nvPr>
+        </p:nvSpPr>
+        <p:spPr/>
+        <p:txBody>
+          <a:bodyPr/>
+          <a:lstStyle/>
+          <a:p>
+            <a:pPr>
+              <a:defRPr/>
+            </a:pPr>
+            <a:fld id="{2E4304A7-0FB2-4094-BC1E-DB17183AD0C1}" type="slidenum">
+              <a:rPr lang="en-US" altLang="x-none" smtClean="0"/>
+              <a:pPr>
+                <a:defRPr/>
+              </a:pPr>
+              <a:t>7</a:t>
+            </a:fld>
+            <a:endParaRPr lang="en-US" altLang="x-none"/>
+          </a:p>
+        </p:txBody>
+      </p:sp>
+      <p:sp>
+        <p:nvSpPr>
+          <p:cNvPr id="41" name="Rectangle 40">
+            <a:extLst>
+              <a:ext uri="{FF2B5EF4-FFF2-40B4-BE49-F238E27FC236}">
+                <a16:creationId xmlns:a16="http://schemas.microsoft.com/office/drawing/2014/main" id="{9D2C5CD7-5EF7-0149-A160-721F4F8BF5A1}"/>
+              </a:ext>
+            </a:extLst>
+          </p:cNvPr>
+          <p:cNvSpPr>
+            <a:spLocks noChangeAspect="1"/>
+          </p:cNvSpPr>
+          <p:nvPr/>
+        </p:nvSpPr>
+        <p:spPr>
+          <a:xfrm>
+            <a:off x="5264016" y="1918675"/>
+            <a:ext cx="1268507" cy="634949"/>
+          </a:xfrm>
+          <a:prstGeom prst="rect">
+            <a:avLst/>
+          </a:prstGeom>
+        </p:spPr>
+        <p:style>
+          <a:lnRef idx="1">
+            <a:schemeClr val="accent1"/>
+          </a:lnRef>
+          <a:fillRef idx="3">
+            <a:schemeClr val="accent1"/>
+          </a:fillRef>
+          <a:effectRef idx="2">
+            <a:schemeClr val="accent1"/>
+          </a:effectRef>
+          <a:fontRef idx="minor">
+            <a:schemeClr val="lt1"/>
+          </a:fontRef>
+        </p:style>
+        <p:txBody>
+          <a:bodyPr rtlCol="0" anchor="ctr"/>
+          <a:lstStyle/>
+          <a:p>
+            <a:pPr algn="ctr"/>
+            <a:r>
+              <a:rPr lang="en-US" sz="1600" dirty="0" err="1">
+                <a:latin typeface="Courier New" panose="02070309020205020404" pitchFamily="49" charset="0"/>
+                <a:cs typeface="Courier New" panose="02070309020205020404" pitchFamily="49" charset="0"/>
+              </a:rPr>
+              <a:t>wolf_sys</a:t>
+            </a:r>
+            <a:endParaRPr lang="en-US" sz="1600" dirty="0">
+              <a:latin typeface="Courier New" panose="02070309020205020404" pitchFamily="49" charset="0"/>
+              <a:cs typeface="Courier New" panose="02070309020205020404" pitchFamily="49" charset="0"/>
+            </a:endParaRPr>
+          </a:p>
+        </p:txBody>
+      </p:sp>
+      <p:cxnSp>
+        <p:nvCxnSpPr>
+          <p:cNvPr id="42" name="Straight Arrow Connector 41">
+            <a:extLst>
+              <a:ext uri="{FF2B5EF4-FFF2-40B4-BE49-F238E27FC236}">
+                <a16:creationId xmlns:a16="http://schemas.microsoft.com/office/drawing/2014/main" id="{33B85FA6-F565-A342-9B83-C988EFF8976A}"/>
+              </a:ext>
+            </a:extLst>
+          </p:cNvPr>
+          <p:cNvCxnSpPr>
+            <a:cxnSpLocks/>
+            <a:stCxn id="45" idx="3"/>
+            <a:endCxn id="41" idx="1"/>
+          </p:cNvCxnSpPr>
+          <p:nvPr/>
+        </p:nvCxnSpPr>
+        <p:spPr>
+          <a:xfrm>
+            <a:off x="4534682" y="2227603"/>
+            <a:ext cx="729334" cy="8547"/>
+          </a:xfrm>
+          <a:prstGeom prst="straightConnector1">
+            <a:avLst/>
+          </a:prstGeom>
+          <a:ln>
+            <a:tailEnd type="triangle" w="lg" len="lg"/>
+          </a:ln>
+          <a:effectLst>
+            <a:outerShdw dist="20000" sx="1000" sy="1000" rotWithShape="0">
+              <a:srgbClr val="000000"/>
+            </a:outerShdw>
+          </a:effectLst>
+        </p:spPr>
+        <p:style>
+          <a:lnRef idx="2">
+            <a:schemeClr val="accent1"/>
+          </a:lnRef>
+          <a:fillRef idx="0">
+            <a:schemeClr val="accent1"/>
+          </a:fillRef>
+          <a:effectRef idx="1">
+            <a:schemeClr val="accent1"/>
+          </a:effectRef>
+          <a:fontRef idx="minor">
+            <a:schemeClr val="tx1"/>
+          </a:fontRef>
+        </p:style>
+      </p:cxnSp>
+      <p:cxnSp>
+        <p:nvCxnSpPr>
+          <p:cNvPr id="43" name="Straight Arrow Connector 42">
+            <a:extLst>
+              <a:ext uri="{FF2B5EF4-FFF2-40B4-BE49-F238E27FC236}">
+                <a16:creationId xmlns:a16="http://schemas.microsoft.com/office/drawing/2014/main" id="{9283C526-95FD-DD48-8D64-79DF32A3018A}"/>
+              </a:ext>
+            </a:extLst>
+          </p:cNvPr>
+          <p:cNvCxnSpPr>
+            <a:cxnSpLocks/>
+            <a:stCxn id="41" idx="3"/>
+            <a:endCxn id="58" idx="2"/>
+          </p:cNvCxnSpPr>
+          <p:nvPr/>
+        </p:nvCxnSpPr>
+        <p:spPr>
+          <a:xfrm flipV="1">
+            <a:off x="6532523" y="2228853"/>
+            <a:ext cx="296169" cy="7297"/>
+          </a:xfrm>
+          <a:prstGeom prst="straightConnector1">
+            <a:avLst/>
+          </a:prstGeom>
+          <a:ln>
+            <a:tailEnd type="triangle" w="lg" len="lg"/>
+          </a:ln>
+          <a:effectLst>
+            <a:outerShdw dist="20000" sx="1000" sy="1000" rotWithShape="0">
+              <a:srgbClr val="000000"/>
+            </a:outerShdw>
+          </a:effectLst>
+        </p:spPr>
+        <p:style>
+          <a:lnRef idx="2">
+            <a:schemeClr val="accent1"/>
+          </a:lnRef>
+          <a:fillRef idx="0">
+            <a:schemeClr val="accent1"/>
+          </a:fillRef>
+          <a:effectRef idx="1">
+            <a:schemeClr val="accent1"/>
+          </a:effectRef>
+          <a:fontRef idx="minor">
+            <a:schemeClr val="tx1"/>
+          </a:fontRef>
+        </p:style>
+      </p:cxnSp>
+      <p:sp>
+        <p:nvSpPr>
+          <p:cNvPr id="45" name="Rectangle 44">
+            <a:extLst>
+              <a:ext uri="{FF2B5EF4-FFF2-40B4-BE49-F238E27FC236}">
+                <a16:creationId xmlns:a16="http://schemas.microsoft.com/office/drawing/2014/main" id="{17F19C0A-4E6F-334D-BD24-1FC484764B18}"/>
+              </a:ext>
+            </a:extLst>
+          </p:cNvPr>
+          <p:cNvSpPr>
+            <a:spLocks noChangeAspect="1"/>
+          </p:cNvSpPr>
+          <p:nvPr/>
+        </p:nvSpPr>
+        <p:spPr>
+          <a:xfrm>
+            <a:off x="3027170" y="1910128"/>
+            <a:ext cx="1507512" cy="634950"/>
+          </a:xfrm>
+          <a:prstGeom prst="rect">
+            <a:avLst/>
+          </a:prstGeom>
+        </p:spPr>
+        <p:style>
+          <a:lnRef idx="1">
+            <a:schemeClr val="accent1"/>
+          </a:lnRef>
+          <a:fillRef idx="3">
+            <a:schemeClr val="accent1"/>
+          </a:fillRef>
+          <a:effectRef idx="2">
+            <a:schemeClr val="accent1"/>
+          </a:effectRef>
+          <a:fontRef idx="minor">
+            <a:schemeClr val="lt1"/>
+          </a:fontRef>
+        </p:style>
+        <p:txBody>
+          <a:bodyPr rtlCol="0" anchor="ctr"/>
+          <a:lstStyle/>
+          <a:p>
+            <a:pPr algn="ctr"/>
             <a:r>
               <a:rPr lang="en-US" sz="1600" dirty="0">
                 <a:latin typeface="Courier New" panose="02070309020205020404" pitchFamily="49" charset="0"/>
@@ -20035,10 +20794,3471 @@
           </a:p>
         </p:txBody>
       </p:sp>
+      <p:cxnSp>
+        <p:nvCxnSpPr>
+          <p:cNvPr id="4" name="Straight Arrow Connector 3">
+            <a:extLst>
+              <a:ext uri="{FF2B5EF4-FFF2-40B4-BE49-F238E27FC236}">
+                <a16:creationId xmlns:a16="http://schemas.microsoft.com/office/drawing/2014/main" id="{6DE365C2-1A66-1608-46D9-9594973F7DFC}"/>
+              </a:ext>
+            </a:extLst>
+          </p:cNvPr>
+          <p:cNvCxnSpPr>
+            <a:cxnSpLocks/>
+          </p:cNvCxnSpPr>
+          <p:nvPr/>
+        </p:nvCxnSpPr>
+        <p:spPr>
+          <a:xfrm flipV="1">
+            <a:off x="5282129" y="4372380"/>
+            <a:ext cx="644896" cy="3806"/>
+          </a:xfrm>
+          <a:prstGeom prst="straightConnector1">
+            <a:avLst/>
+          </a:prstGeom>
+          <a:ln>
+            <a:tailEnd type="triangle" w="lg" len="lg"/>
+          </a:ln>
+          <a:effectLst>
+            <a:outerShdw dist="20000" sx="1000" sy="1000" rotWithShape="0">
+              <a:srgbClr val="000000"/>
+            </a:outerShdw>
+          </a:effectLst>
+        </p:spPr>
+        <p:style>
+          <a:lnRef idx="2">
+            <a:schemeClr val="accent1"/>
+          </a:lnRef>
+          <a:fillRef idx="0">
+            <a:schemeClr val="accent1"/>
+          </a:fillRef>
+          <a:effectRef idx="1">
+            <a:schemeClr val="accent1"/>
+          </a:effectRef>
+          <a:fontRef idx="minor">
+            <a:schemeClr val="tx1"/>
+          </a:fontRef>
+        </p:style>
+      </p:cxnSp>
+      <p:cxnSp>
+        <p:nvCxnSpPr>
+          <p:cNvPr id="6" name="Straight Arrow Connector 5">
+            <a:extLst>
+              <a:ext uri="{FF2B5EF4-FFF2-40B4-BE49-F238E27FC236}">
+                <a16:creationId xmlns:a16="http://schemas.microsoft.com/office/drawing/2014/main" id="{908606F5-43EC-1F62-AACC-B2A3151544F5}"/>
+              </a:ext>
+            </a:extLst>
+          </p:cNvPr>
+          <p:cNvCxnSpPr>
+            <a:cxnSpLocks/>
+          </p:cNvCxnSpPr>
+          <p:nvPr/>
+        </p:nvCxnSpPr>
+        <p:spPr>
+          <a:xfrm>
+            <a:off x="5307068" y="4637354"/>
+            <a:ext cx="606280" cy="0"/>
+          </a:xfrm>
+          <a:prstGeom prst="straightConnector1">
+            <a:avLst/>
+          </a:prstGeom>
+          <a:ln>
+            <a:tailEnd type="triangle" w="lg" len="lg"/>
+          </a:ln>
+          <a:effectLst>
+            <a:outerShdw dist="20000" sx="1000" sy="1000" rotWithShape="0">
+              <a:srgbClr val="000000"/>
+            </a:outerShdw>
+          </a:effectLst>
+        </p:spPr>
+        <p:style>
+          <a:lnRef idx="2">
+            <a:schemeClr val="accent1"/>
+          </a:lnRef>
+          <a:fillRef idx="0">
+            <a:schemeClr val="accent1"/>
+          </a:fillRef>
+          <a:effectRef idx="1">
+            <a:schemeClr val="accent1"/>
+          </a:effectRef>
+          <a:fontRef idx="minor">
+            <a:schemeClr val="tx1"/>
+          </a:fontRef>
+        </p:style>
+      </p:cxnSp>
+      <p:sp>
+        <p:nvSpPr>
+          <p:cNvPr id="8" name="Rectangle 7">
+            <a:extLst>
+              <a:ext uri="{FF2B5EF4-FFF2-40B4-BE49-F238E27FC236}">
+                <a16:creationId xmlns:a16="http://schemas.microsoft.com/office/drawing/2014/main" id="{04A5F843-2A08-C7FC-7464-AD1FB96BAE98}"/>
+              </a:ext>
+            </a:extLst>
+          </p:cNvPr>
+          <p:cNvSpPr/>
+          <p:nvPr/>
+        </p:nvSpPr>
+        <p:spPr>
+          <a:xfrm>
+            <a:off x="3994847" y="4180710"/>
+            <a:ext cx="1172116" cy="338554"/>
+          </a:xfrm>
+          <a:prstGeom prst="rect">
+            <a:avLst/>
+          </a:prstGeom>
+        </p:spPr>
+        <p:txBody>
+          <a:bodyPr wrap="none">
+            <a:spAutoFit/>
+          </a:bodyPr>
+          <a:lstStyle/>
+          <a:p>
+            <a:pPr/>
+            <a:r>
+              <a:rPr lang="en-US" sz="1600" dirty="0">
+                <a:solidFill>
+                  <a:schemeClr val="tx1"/>
+                </a:solidFill>
+                <a:latin typeface="Courier New" panose="02070309020205020404" pitchFamily="49" charset="0"/>
+                <a:cs typeface="Courier New" panose="02070309020205020404" pitchFamily="49" charset="0"/>
+              </a:rPr>
+              <a:t>setpoint</a:t>
+            </a:r>
+          </a:p>
+        </p:txBody>
+      </p:sp>
+      <p:sp>
+        <p:nvSpPr>
+          <p:cNvPr id="9" name="Rectangle 8">
+            <a:extLst>
+              <a:ext uri="{FF2B5EF4-FFF2-40B4-BE49-F238E27FC236}">
+                <a16:creationId xmlns:a16="http://schemas.microsoft.com/office/drawing/2014/main" id="{3D28703C-BF5B-BB64-6529-845139C2DFDB}"/>
+              </a:ext>
+            </a:extLst>
+          </p:cNvPr>
+          <p:cNvSpPr>
+            <a:spLocks noChangeAspect="1"/>
+          </p:cNvSpPr>
+          <p:nvPr/>
+        </p:nvSpPr>
+        <p:spPr>
+          <a:xfrm>
+            <a:off x="5936369" y="4116418"/>
+            <a:ext cx="1453201" cy="634950"/>
+          </a:xfrm>
+          <a:prstGeom prst="rect">
+            <a:avLst/>
+          </a:prstGeom>
+        </p:spPr>
+        <p:style>
+          <a:lnRef idx="1">
+            <a:schemeClr val="accent1"/>
+          </a:lnRef>
+          <a:fillRef idx="3">
+            <a:schemeClr val="accent1"/>
+          </a:fillRef>
+          <a:effectRef idx="2">
+            <a:schemeClr val="accent1"/>
+          </a:effectRef>
+          <a:fontRef idx="minor">
+            <a:schemeClr val="lt1"/>
+          </a:fontRef>
+        </p:style>
+        <p:txBody>
+          <a:bodyPr rtlCol="0" anchor="ctr"/>
+          <a:lstStyle/>
+          <a:p>
+            <a:pPr algn="ctr"/>
+            <a:r>
+              <a:rPr lang="en-US" sz="1600" dirty="0" err="1">
+                <a:latin typeface="Courier New" panose="02070309020205020404" pitchFamily="49" charset="0"/>
+                <a:cs typeface="Courier New" panose="02070309020205020404" pitchFamily="49" charset="0"/>
+              </a:rPr>
+              <a:t>differ_sys</a:t>
+            </a:r>
+            <a:endParaRPr lang="en-US" sz="1600" dirty="0">
+              <a:latin typeface="Courier New" panose="02070309020205020404" pitchFamily="49" charset="0"/>
+              <a:cs typeface="Courier New" panose="02070309020205020404" pitchFamily="49" charset="0"/>
+            </a:endParaRPr>
+          </a:p>
+        </p:txBody>
+      </p:sp>
+      <p:sp>
+        <p:nvSpPr>
+          <p:cNvPr id="11" name="Rectangle 10">
+            <a:extLst>
+              <a:ext uri="{FF2B5EF4-FFF2-40B4-BE49-F238E27FC236}">
+                <a16:creationId xmlns:a16="http://schemas.microsoft.com/office/drawing/2014/main" id="{E0F83F98-D089-6D0B-9366-84DE9195429E}"/>
+              </a:ext>
+            </a:extLst>
+          </p:cNvPr>
+          <p:cNvSpPr/>
+          <p:nvPr/>
+        </p:nvSpPr>
+        <p:spPr>
+          <a:xfrm>
+            <a:off x="3773536" y="4452765"/>
+            <a:ext cx="1542410" cy="338554"/>
+          </a:xfrm>
+          <a:prstGeom prst="rect">
+            <a:avLst/>
+          </a:prstGeom>
+        </p:spPr>
+        <p:txBody>
+          <a:bodyPr wrap="none">
+            <a:spAutoFit/>
+          </a:bodyPr>
+          <a:lstStyle/>
+          <a:p>
+            <a:pPr/>
+            <a:r>
+              <a:rPr lang="en-US" sz="1600" dirty="0">
+                <a:solidFill>
+                  <a:schemeClr val="tx1"/>
+                </a:solidFill>
+                <a:latin typeface="Courier New" panose="02070309020205020404" pitchFamily="49" charset="0"/>
+                <a:cs typeface="Courier New" panose="02070309020205020404" pitchFamily="49" charset="0"/>
+              </a:rPr>
+              <a:t>measurement</a:t>
+            </a:r>
+          </a:p>
+        </p:txBody>
+      </p:sp>
+      <p:cxnSp>
+        <p:nvCxnSpPr>
+          <p:cNvPr id="12" name="Straight Arrow Connector 11">
+            <a:extLst>
+              <a:ext uri="{FF2B5EF4-FFF2-40B4-BE49-F238E27FC236}">
+                <a16:creationId xmlns:a16="http://schemas.microsoft.com/office/drawing/2014/main" id="{20BDA8A3-954D-2B4C-6D0B-54BBFA612645}"/>
+              </a:ext>
+            </a:extLst>
+          </p:cNvPr>
+          <p:cNvCxnSpPr>
+            <a:cxnSpLocks/>
+            <a:stCxn id="9" idx="3"/>
+            <a:endCxn id="14" idx="1"/>
+          </p:cNvCxnSpPr>
+          <p:nvPr/>
+        </p:nvCxnSpPr>
+        <p:spPr>
+          <a:xfrm>
+            <a:off x="7389570" y="4433893"/>
+            <a:ext cx="270018" cy="2054"/>
+          </a:xfrm>
+          <a:prstGeom prst="straightConnector1">
+            <a:avLst/>
+          </a:prstGeom>
+          <a:ln>
+            <a:tailEnd type="triangle" w="lg" len="lg"/>
+          </a:ln>
+          <a:effectLst>
+            <a:outerShdw dist="20000" sx="1000" sy="1000" rotWithShape="0">
+              <a:srgbClr val="000000"/>
+            </a:outerShdw>
+          </a:effectLst>
+        </p:spPr>
+        <p:style>
+          <a:lnRef idx="2">
+            <a:schemeClr val="accent1"/>
+          </a:lnRef>
+          <a:fillRef idx="0">
+            <a:schemeClr val="accent1"/>
+          </a:fillRef>
+          <a:effectRef idx="1">
+            <a:schemeClr val="accent1"/>
+          </a:effectRef>
+          <a:fontRef idx="minor">
+            <a:schemeClr val="tx1"/>
+          </a:fontRef>
+        </p:style>
+      </p:cxnSp>
+      <p:sp>
+        <p:nvSpPr>
+          <p:cNvPr id="14" name="Rectangle 13">
+            <a:extLst>
+              <a:ext uri="{FF2B5EF4-FFF2-40B4-BE49-F238E27FC236}">
+                <a16:creationId xmlns:a16="http://schemas.microsoft.com/office/drawing/2014/main" id="{EC920F55-639E-7017-50ED-AB65A04F3417}"/>
+              </a:ext>
+            </a:extLst>
+          </p:cNvPr>
+          <p:cNvSpPr/>
+          <p:nvPr/>
+        </p:nvSpPr>
+        <p:spPr>
+          <a:xfrm>
+            <a:off x="7659588" y="4266670"/>
+            <a:ext cx="554960" cy="338554"/>
+          </a:xfrm>
+          <a:prstGeom prst="rect">
+            <a:avLst/>
+          </a:prstGeom>
+        </p:spPr>
+        <p:txBody>
+          <a:bodyPr wrap="square">
+            <a:spAutoFit/>
+          </a:bodyPr>
+          <a:lstStyle/>
+          <a:p>
+            <a:pPr/>
+            <a:r>
+              <a:rPr lang="en-US" sz="1600" dirty="0">
+                <a:solidFill>
+                  <a:schemeClr val="tx1"/>
+                </a:solidFill>
+                <a:latin typeface="Courier New" panose="02070309020205020404" pitchFamily="49" charset="0"/>
+                <a:cs typeface="Courier New" panose="02070309020205020404" pitchFamily="49" charset="0"/>
+              </a:rPr>
+              <a:t>out</a:t>
+            </a:r>
+          </a:p>
+        </p:txBody>
+      </p:sp>
+      <p:cxnSp>
+        <p:nvCxnSpPr>
+          <p:cNvPr id="16" name="Straight Arrow Connector 15">
+            <a:extLst>
+              <a:ext uri="{FF2B5EF4-FFF2-40B4-BE49-F238E27FC236}">
+                <a16:creationId xmlns:a16="http://schemas.microsoft.com/office/drawing/2014/main" id="{638AF334-84A9-5D85-5727-85069AD38D6F}"/>
+              </a:ext>
+            </a:extLst>
+          </p:cNvPr>
+          <p:cNvCxnSpPr>
+            <a:cxnSpLocks/>
+          </p:cNvCxnSpPr>
+          <p:nvPr/>
+        </p:nvCxnSpPr>
+        <p:spPr>
+          <a:xfrm flipV="1">
+            <a:off x="1294813" y="4493827"/>
+            <a:ext cx="644896" cy="3806"/>
+          </a:xfrm>
+          <a:prstGeom prst="straightConnector1">
+            <a:avLst/>
+          </a:prstGeom>
+          <a:ln>
+            <a:tailEnd type="triangle" w="lg" len="lg"/>
+          </a:ln>
+          <a:effectLst>
+            <a:outerShdw dist="20000" sx="1000" sy="1000" rotWithShape="0">
+              <a:srgbClr val="000000"/>
+            </a:outerShdw>
+          </a:effectLst>
+        </p:spPr>
+        <p:style>
+          <a:lnRef idx="2">
+            <a:schemeClr val="accent1"/>
+          </a:lnRef>
+          <a:fillRef idx="0">
+            <a:schemeClr val="accent1"/>
+          </a:fillRef>
+          <a:effectRef idx="1">
+            <a:schemeClr val="accent1"/>
+          </a:effectRef>
+          <a:fontRef idx="minor">
+            <a:schemeClr val="tx1"/>
+          </a:fontRef>
+        </p:style>
+      </p:cxnSp>
+      <p:sp>
+        <p:nvSpPr>
+          <p:cNvPr id="17" name="Oval 16">
+            <a:extLst>
+              <a:ext uri="{FF2B5EF4-FFF2-40B4-BE49-F238E27FC236}">
+                <a16:creationId xmlns:a16="http://schemas.microsoft.com/office/drawing/2014/main" id="{BC9F46BB-64C8-3ECB-2667-0870D71C6CEA}"/>
+              </a:ext>
+            </a:extLst>
+          </p:cNvPr>
+          <p:cNvSpPr/>
+          <p:nvPr/>
+        </p:nvSpPr>
+        <p:spPr>
+          <a:xfrm>
+            <a:off x="1950534" y="4320703"/>
+            <a:ext cx="301841" cy="301840"/>
+          </a:xfrm>
+          <a:prstGeom prst="ellipse">
+            <a:avLst/>
+          </a:prstGeom>
+        </p:spPr>
+        <p:style>
+          <a:lnRef idx="1">
+            <a:schemeClr val="accent1"/>
+          </a:lnRef>
+          <a:fillRef idx="3">
+            <a:schemeClr val="accent1"/>
+          </a:fillRef>
+          <a:effectRef idx="2">
+            <a:schemeClr val="accent1"/>
+          </a:effectRef>
+          <a:fontRef idx="minor">
+            <a:schemeClr val="lt1"/>
+          </a:fontRef>
+        </p:style>
+        <p:txBody>
+          <a:bodyPr rtlCol="0" anchor="ctr"/>
+          <a:lstStyle/>
+          <a:p>
+            <a:pPr algn="ctr"/>
+            <a:r>
+              <a:rPr lang="en-US" dirty="0"/>
+              <a:t>+</a:t>
+            </a:r>
+          </a:p>
+        </p:txBody>
+      </p:sp>
+      <p:cxnSp>
+        <p:nvCxnSpPr>
+          <p:cNvPr id="18" name="Straight Arrow Connector 17">
+            <a:extLst>
+              <a:ext uri="{FF2B5EF4-FFF2-40B4-BE49-F238E27FC236}">
+                <a16:creationId xmlns:a16="http://schemas.microsoft.com/office/drawing/2014/main" id="{49ABE68E-7ED3-46DE-A574-B38808A4FDA6}"/>
+              </a:ext>
+            </a:extLst>
+          </p:cNvPr>
+          <p:cNvCxnSpPr>
+            <a:cxnSpLocks/>
+            <a:stCxn id="17" idx="6"/>
+          </p:cNvCxnSpPr>
+          <p:nvPr/>
+        </p:nvCxnSpPr>
+        <p:spPr>
+          <a:xfrm flipV="1">
+            <a:off x="2252375" y="4463252"/>
+            <a:ext cx="389660" cy="8371"/>
+          </a:xfrm>
+          <a:prstGeom prst="straightConnector1">
+            <a:avLst/>
+          </a:prstGeom>
+          <a:ln>
+            <a:tailEnd type="triangle" w="lg" len="lg"/>
+          </a:ln>
+          <a:effectLst>
+            <a:outerShdw dist="20000" sx="1000" sy="1000" rotWithShape="0">
+              <a:srgbClr val="000000"/>
+            </a:outerShdw>
+          </a:effectLst>
+        </p:spPr>
+        <p:style>
+          <a:lnRef idx="2">
+            <a:schemeClr val="accent1"/>
+          </a:lnRef>
+          <a:fillRef idx="0">
+            <a:schemeClr val="accent1"/>
+          </a:fillRef>
+          <a:effectRef idx="1">
+            <a:schemeClr val="accent1"/>
+          </a:effectRef>
+          <a:fontRef idx="minor">
+            <a:schemeClr val="tx1"/>
+          </a:fontRef>
+        </p:style>
+      </p:cxnSp>
+      <mc:AlternateContent xmlns:mc="http://schemas.openxmlformats.org/markup-compatibility/2006">
+        <mc:Choice xmlns:a14="http://schemas.microsoft.com/office/drawing/2010/main" Requires="a14">
+          <p:sp>
+            <p:nvSpPr>
+              <p:cNvPr id="19" name="TextBox 18">
+                <a:extLst>
+                  <a:ext uri="{FF2B5EF4-FFF2-40B4-BE49-F238E27FC236}">
+                    <a16:creationId xmlns:a16="http://schemas.microsoft.com/office/drawing/2014/main" id="{7FAC05E9-51EB-435F-6681-E94EB906C4A9}"/>
+                  </a:ext>
+                </a:extLst>
+              </p:cNvPr>
+              <p:cNvSpPr txBox="1"/>
+              <p:nvPr/>
+            </p:nvSpPr>
+            <p:spPr>
+              <a:xfrm>
+                <a:off x="1833945" y="4794286"/>
+                <a:ext cx="237244" cy="276999"/>
+              </a:xfrm>
+              <a:prstGeom prst="rect">
+                <a:avLst/>
+              </a:prstGeom>
+              <a:noFill/>
+            </p:spPr>
+            <p:txBody>
+              <a:bodyPr wrap="none" lIns="0" tIns="0" rIns="0" bIns="0" rtlCol="0">
+                <a:spAutoFit/>
+              </a:bodyPr>
+              <a:lstStyle/>
+              <a:p>
+                <a:pPr/>
+                <a14:m>
+                  <m:oMathPara xmlns:m="http://schemas.openxmlformats.org/officeDocument/2006/math">
+                    <m:oMathParaPr>
+                      <m:jc m:val="centerGroup"/>
+                    </m:oMathParaPr>
+                    <m:oMath xmlns:m="http://schemas.openxmlformats.org/officeDocument/2006/math">
+                      <m:r>
+                        <a:rPr lang="en-US" b="0" i="1" smtClean="0">
+                          <a:latin typeface="Cambria Math" panose="02040503050406030204" pitchFamily="18" charset="0"/>
+                        </a:rPr>
+                        <m:t>−</m:t>
+                      </m:r>
+                    </m:oMath>
+                  </m:oMathPara>
+                </a14:m>
+                <a:endParaRPr lang="en-US" dirty="0"/>
+              </a:p>
+            </p:txBody>
+          </p:sp>
+        </mc:Choice>
+        <mc:Fallback>
+          <p:sp>
+            <p:nvSpPr>
+              <p:cNvPr id="19" name="TextBox 18">
+                <a:extLst>
+                  <a:ext uri="{FF2B5EF4-FFF2-40B4-BE49-F238E27FC236}">
+                    <a16:creationId xmlns:a16="http://schemas.microsoft.com/office/drawing/2014/main" id="{7FAC05E9-51EB-435F-6681-E94EB906C4A9}"/>
+                  </a:ext>
+                </a:extLst>
+              </p:cNvPr>
+              <p:cNvSpPr txBox="1">
+                <a:spLocks noRot="1" noChangeAspect="1" noMove="1" noResize="1" noEditPoints="1" noAdjustHandles="1" noChangeArrowheads="1" noChangeShapeType="1" noTextEdit="1"/>
+              </p:cNvSpPr>
+              <p:nvPr/>
+            </p:nvSpPr>
+            <p:spPr>
+              <a:xfrm>
+                <a:off x="1833945" y="4794286"/>
+                <a:ext cx="237244" cy="276999"/>
+              </a:xfrm>
+              <a:prstGeom prst="rect">
+                <a:avLst/>
+              </a:prstGeom>
+              <a:blipFill>
+                <a:blip r:embed="rId4"/>
+                <a:stretch>
+                  <a:fillRect/>
+                </a:stretch>
+              </a:blipFill>
+            </p:spPr>
+            <p:txBody>
+              <a:bodyPr/>
+              <a:lstStyle/>
+              <a:p>
+                <a:r>
+                  <a:rPr lang="en-US">
+                    <a:noFill/>
+                  </a:rPr>
+                  <a:t> </a:t>
+                </a:r>
+              </a:p>
+            </p:txBody>
+          </p:sp>
+        </mc:Fallback>
+      </mc:AlternateContent>
+      <p:sp>
+        <p:nvSpPr>
+          <p:cNvPr id="20" name="Rectangle 19">
+            <a:extLst>
+              <a:ext uri="{FF2B5EF4-FFF2-40B4-BE49-F238E27FC236}">
+                <a16:creationId xmlns:a16="http://schemas.microsoft.com/office/drawing/2014/main" id="{433A0D73-9191-C357-4147-9C2EEBF9DDAA}"/>
+              </a:ext>
+            </a:extLst>
+          </p:cNvPr>
+          <p:cNvSpPr/>
+          <p:nvPr/>
+        </p:nvSpPr>
+        <p:spPr>
+          <a:xfrm>
+            <a:off x="348356" y="4152528"/>
+            <a:ext cx="1572866" cy="338554"/>
+          </a:xfrm>
+          <a:prstGeom prst="rect">
+            <a:avLst/>
+          </a:prstGeom>
+        </p:spPr>
+        <p:txBody>
+          <a:bodyPr wrap="none">
+            <a:spAutoFit/>
+          </a:bodyPr>
+          <a:lstStyle/>
+          <a:p>
+            <a:pPr/>
+            <a:r>
+              <a:rPr lang="en-US" sz="1600" dirty="0">
+                <a:solidFill>
+                  <a:schemeClr val="tx1"/>
+                </a:solidFill>
+                <a:latin typeface="Courier New" panose="02070309020205020404" pitchFamily="49" charset="0"/>
+                <a:cs typeface="Courier New" panose="02070309020205020404" pitchFamily="49" charset="0"/>
+              </a:rPr>
+              <a:t>S5_SETPOINT</a:t>
+            </a:r>
+          </a:p>
+        </p:txBody>
+      </p:sp>
+      <p:cxnSp>
+        <p:nvCxnSpPr>
+          <p:cNvPr id="21" name="Straight Arrow Connector 20">
+            <a:extLst>
+              <a:ext uri="{FF2B5EF4-FFF2-40B4-BE49-F238E27FC236}">
+                <a16:creationId xmlns:a16="http://schemas.microsoft.com/office/drawing/2014/main" id="{A6DE9D7A-80B5-BF4E-BCB8-5E0A1E8381DB}"/>
+              </a:ext>
+            </a:extLst>
+          </p:cNvPr>
+          <p:cNvCxnSpPr>
+            <a:cxnSpLocks/>
+          </p:cNvCxnSpPr>
+          <p:nvPr/>
+        </p:nvCxnSpPr>
+        <p:spPr>
+          <a:xfrm flipV="1">
+            <a:off x="2078911" y="4637725"/>
+            <a:ext cx="8904" cy="359885"/>
+          </a:xfrm>
+          <a:prstGeom prst="straightConnector1">
+            <a:avLst/>
+          </a:prstGeom>
+          <a:ln>
+            <a:tailEnd type="triangle" w="lg" len="lg"/>
+          </a:ln>
+          <a:effectLst>
+            <a:outerShdw dist="20000" sx="1000" sy="1000" rotWithShape="0">
+              <a:srgbClr val="000000"/>
+            </a:outerShdw>
+          </a:effectLst>
+        </p:spPr>
+        <p:style>
+          <a:lnRef idx="2">
+            <a:schemeClr val="accent1"/>
+          </a:lnRef>
+          <a:fillRef idx="0">
+            <a:schemeClr val="accent1"/>
+          </a:fillRef>
+          <a:effectRef idx="1">
+            <a:schemeClr val="accent1"/>
+          </a:effectRef>
+          <a:fontRef idx="minor">
+            <a:schemeClr val="tx1"/>
+          </a:fontRef>
+        </p:style>
+      </p:cxnSp>
+      <p:sp>
+        <p:nvSpPr>
+          <p:cNvPr id="23" name="Notched Right Arrow 22">
+            <a:extLst>
+              <a:ext uri="{FF2B5EF4-FFF2-40B4-BE49-F238E27FC236}">
+                <a16:creationId xmlns:a16="http://schemas.microsoft.com/office/drawing/2014/main" id="{1C413483-85C8-CD58-E1CF-ADF10B533129}"/>
+              </a:ext>
+            </a:extLst>
+          </p:cNvPr>
+          <p:cNvSpPr/>
+          <p:nvPr/>
+        </p:nvSpPr>
+        <p:spPr>
+          <a:xfrm>
+            <a:off x="2970987" y="4337752"/>
+            <a:ext cx="601099" cy="269419"/>
+          </a:xfrm>
+          <a:prstGeom prst="notchedRightArrow">
+            <a:avLst/>
+          </a:prstGeom>
+          <a:solidFill>
+            <a:schemeClr val="bg1">
+              <a:lumMod val="95000"/>
+            </a:schemeClr>
+          </a:solidFill>
+        </p:spPr>
+        <p:style>
+          <a:lnRef idx="2">
+            <a:schemeClr val="accent1">
+              <a:shade val="50000"/>
+            </a:schemeClr>
+          </a:lnRef>
+          <a:fillRef idx="1">
+            <a:schemeClr val="accent1"/>
+          </a:fillRef>
+          <a:effectRef idx="0">
+            <a:schemeClr val="accent1"/>
+          </a:effectRef>
+          <a:fontRef idx="minor">
+            <a:schemeClr val="lt1"/>
+          </a:fontRef>
+        </p:style>
+        <p:txBody>
+          <a:bodyPr rtlCol="0" anchor="ctr"/>
+          <a:lstStyle/>
+          <a:p>
+            <a:pPr algn="ctr"/>
+            <a:endParaRPr lang="en-US"/>
+          </a:p>
+        </p:txBody>
+      </p:sp>
     </p:spTree>
     <p:extLst>
       <p:ext uri="{BB962C8B-B14F-4D97-AF65-F5344CB8AC3E}">
-        <p14:creationId xmlns:p14="http://schemas.microsoft.com/office/powerpoint/2010/main" val="225109070"/>
+        <p14:creationId xmlns:p14="http://schemas.microsoft.com/office/powerpoint/2010/main" val="1107656744"/>
+      </p:ext>
+    </p:extLst>
+  </p:cSld>
+  <p:clrMapOvr>
+    <a:masterClrMapping/>
+  </p:clrMapOvr>
+</p:sld>
+</file>
+
+<file path=ppt/slides/slide8.xml><?xml version="1.0" encoding="utf-8"?>
+<p:sld xmlns:a="http://schemas.openxmlformats.org/drawingml/2006/main" xmlns:r="http://schemas.openxmlformats.org/officeDocument/2006/relationships" xmlns:p="http://schemas.openxmlformats.org/presentationml/2006/main">
+  <p:cSld>
+    <p:spTree>
+      <p:nvGrpSpPr>
+        <p:cNvPr id="1" name=""/>
+        <p:cNvGrpSpPr/>
+        <p:nvPr/>
+      </p:nvGrpSpPr>
+      <p:grpSpPr>
+        <a:xfrm>
+          <a:off x="0" y="0"/>
+          <a:ext cx="0" cy="0"/>
+          <a:chOff x="0" y="0"/>
+          <a:chExt cx="0" cy="0"/>
+        </a:xfrm>
+      </p:grpSpPr>
+      <p:sp>
+        <p:nvSpPr>
+          <p:cNvPr id="2" name="Title 1">
+            <a:extLst>
+              <a:ext uri="{FF2B5EF4-FFF2-40B4-BE49-F238E27FC236}">
+                <a16:creationId xmlns:a16="http://schemas.microsoft.com/office/drawing/2014/main" id="{6CF811BA-8C43-DB43-9A58-7F630C6185FD}"/>
+              </a:ext>
+            </a:extLst>
+          </p:cNvPr>
+          <p:cNvSpPr>
+            <a:spLocks noGrp="1"/>
+          </p:cNvSpPr>
+          <p:nvPr>
+            <p:ph type="title"/>
+          </p:nvPr>
+        </p:nvSpPr>
+        <p:spPr/>
+        <p:txBody>
+          <a:bodyPr/>
+          <a:lstStyle/>
+          <a:p>
+            <a:r>
+              <a:rPr lang="en-US" dirty="0"/>
+              <a:t>Homework 1</a:t>
+            </a:r>
+          </a:p>
+        </p:txBody>
+      </p:sp>
+      <p:sp>
+        <p:nvSpPr>
+          <p:cNvPr id="3" name="Slide Number Placeholder 2">
+            <a:extLst>
+              <a:ext uri="{FF2B5EF4-FFF2-40B4-BE49-F238E27FC236}">
+                <a16:creationId xmlns:a16="http://schemas.microsoft.com/office/drawing/2014/main" id="{BF0E0FF1-290E-6F42-9F42-6FFE9B7272B7}"/>
+              </a:ext>
+            </a:extLst>
+          </p:cNvPr>
+          <p:cNvSpPr>
+            <a:spLocks noGrp="1"/>
+          </p:cNvSpPr>
+          <p:nvPr>
+            <p:ph type="sldNum" sz="quarter" idx="11"/>
+          </p:nvPr>
+        </p:nvSpPr>
+        <p:spPr/>
+        <p:txBody>
+          <a:bodyPr/>
+          <a:lstStyle/>
+          <a:p>
+            <a:pPr>
+              <a:defRPr/>
+            </a:pPr>
+            <a:fld id="{2E4304A7-0FB2-4094-BC1E-DB17183AD0C1}" type="slidenum">
+              <a:rPr lang="en-US" altLang="x-none" smtClean="0"/>
+              <a:pPr>
+                <a:defRPr/>
+              </a:pPr>
+              <a:t>8</a:t>
+            </a:fld>
+            <a:endParaRPr lang="en-US" altLang="x-none"/>
+          </a:p>
+        </p:txBody>
+      </p:sp>
+      <p:sp>
+        <p:nvSpPr>
+          <p:cNvPr id="7" name="Rectangle 6">
+            <a:extLst>
+              <a:ext uri="{FF2B5EF4-FFF2-40B4-BE49-F238E27FC236}">
+                <a16:creationId xmlns:a16="http://schemas.microsoft.com/office/drawing/2014/main" id="{DC48F7C1-FDE5-B36E-23D7-2554E50CA2E1}"/>
+              </a:ext>
+            </a:extLst>
+          </p:cNvPr>
+          <p:cNvSpPr>
+            <a:spLocks noChangeAspect="1"/>
+          </p:cNvSpPr>
+          <p:nvPr/>
+        </p:nvSpPr>
+        <p:spPr>
+          <a:xfrm>
+            <a:off x="4768416" y="1968551"/>
+            <a:ext cx="643565" cy="634949"/>
+          </a:xfrm>
+          <a:prstGeom prst="rect">
+            <a:avLst/>
+          </a:prstGeom>
+        </p:spPr>
+        <p:style>
+          <a:lnRef idx="1">
+            <a:schemeClr val="accent1"/>
+          </a:lnRef>
+          <a:fillRef idx="3">
+            <a:schemeClr val="accent1"/>
+          </a:fillRef>
+          <a:effectRef idx="2">
+            <a:schemeClr val="accent1"/>
+          </a:effectRef>
+          <a:fontRef idx="minor">
+            <a:schemeClr val="lt1"/>
+          </a:fontRef>
+        </p:style>
+        <p:txBody>
+          <a:bodyPr rtlCol="0" anchor="ctr"/>
+          <a:lstStyle/>
+          <a:p>
+            <a:pPr algn="ctr"/>
+            <a:endParaRPr lang="en-US" sz="1600" dirty="0"/>
+          </a:p>
+        </p:txBody>
+      </p:sp>
+      <p:cxnSp>
+        <p:nvCxnSpPr>
+          <p:cNvPr id="10" name="Straight Arrow Connector 9">
+            <a:extLst>
+              <a:ext uri="{FF2B5EF4-FFF2-40B4-BE49-F238E27FC236}">
+                <a16:creationId xmlns:a16="http://schemas.microsoft.com/office/drawing/2014/main" id="{00EFD46D-425C-E808-844C-32A9E338CEA1}"/>
+              </a:ext>
+            </a:extLst>
+          </p:cNvPr>
+          <p:cNvCxnSpPr>
+            <a:cxnSpLocks/>
+            <a:stCxn id="24" idx="3"/>
+            <a:endCxn id="7" idx="1"/>
+          </p:cNvCxnSpPr>
+          <p:nvPr/>
+        </p:nvCxnSpPr>
+        <p:spPr>
+          <a:xfrm>
+            <a:off x="3997372" y="2277479"/>
+            <a:ext cx="771044" cy="8547"/>
+          </a:xfrm>
+          <a:prstGeom prst="straightConnector1">
+            <a:avLst/>
+          </a:prstGeom>
+          <a:ln>
+            <a:tailEnd type="triangle" w="lg" len="lg"/>
+          </a:ln>
+          <a:effectLst>
+            <a:outerShdw dist="20000" sx="1000" sy="1000" rotWithShape="0">
+              <a:srgbClr val="000000"/>
+            </a:outerShdw>
+          </a:effectLst>
+        </p:spPr>
+        <p:style>
+          <a:lnRef idx="2">
+            <a:schemeClr val="accent1"/>
+          </a:lnRef>
+          <a:fillRef idx="0">
+            <a:schemeClr val="accent1"/>
+          </a:fillRef>
+          <a:effectRef idx="1">
+            <a:schemeClr val="accent1"/>
+          </a:effectRef>
+          <a:fontRef idx="minor">
+            <a:schemeClr val="tx1"/>
+          </a:fontRef>
+        </p:style>
+      </p:cxnSp>
+      <p:cxnSp>
+        <p:nvCxnSpPr>
+          <p:cNvPr id="15" name="Straight Arrow Connector 14">
+            <a:extLst>
+              <a:ext uri="{FF2B5EF4-FFF2-40B4-BE49-F238E27FC236}">
+                <a16:creationId xmlns:a16="http://schemas.microsoft.com/office/drawing/2014/main" id="{0BC2D456-FD50-2A44-CC41-1D2FF0A289D1}"/>
+              </a:ext>
+            </a:extLst>
+          </p:cNvPr>
+          <p:cNvCxnSpPr>
+            <a:cxnSpLocks/>
+            <a:stCxn id="22" idx="3"/>
+            <a:endCxn id="33" idx="2"/>
+          </p:cNvCxnSpPr>
+          <p:nvPr/>
+        </p:nvCxnSpPr>
+        <p:spPr>
+          <a:xfrm>
+            <a:off x="5425748" y="2212591"/>
+            <a:ext cx="597699" cy="3792"/>
+          </a:xfrm>
+          <a:prstGeom prst="straightConnector1">
+            <a:avLst/>
+          </a:prstGeom>
+          <a:ln>
+            <a:tailEnd type="triangle" w="lg" len="lg"/>
+          </a:ln>
+          <a:effectLst>
+            <a:outerShdw dist="20000" sx="1000" sy="1000" rotWithShape="0">
+              <a:srgbClr val="000000"/>
+            </a:outerShdw>
+          </a:effectLst>
+        </p:spPr>
+        <p:style>
+          <a:lnRef idx="2">
+            <a:schemeClr val="accent1"/>
+          </a:lnRef>
+          <a:fillRef idx="0">
+            <a:schemeClr val="accent1"/>
+          </a:fillRef>
+          <a:effectRef idx="1">
+            <a:schemeClr val="accent1"/>
+          </a:effectRef>
+          <a:fontRef idx="minor">
+            <a:schemeClr val="tx1"/>
+          </a:fontRef>
+        </p:style>
+      </p:cxnSp>
+      <mc:AlternateContent xmlns:mc="http://schemas.openxmlformats.org/markup-compatibility/2006">
+        <mc:Choice xmlns:a14="http://schemas.microsoft.com/office/drawing/2010/main" Requires="a14">
+          <p:sp>
+            <p:nvSpPr>
+              <p:cNvPr id="22" name="Rectangle 21">
+                <a:extLst>
+                  <a:ext uri="{FF2B5EF4-FFF2-40B4-BE49-F238E27FC236}">
+                    <a16:creationId xmlns:a16="http://schemas.microsoft.com/office/drawing/2014/main" id="{8FE68FC6-7C59-D81E-E09F-B84F38B28C8F}"/>
+                  </a:ext>
+                </a:extLst>
+              </p:cNvPr>
+              <p:cNvSpPr/>
+              <p:nvPr/>
+            </p:nvSpPr>
+            <p:spPr>
+              <a:xfrm>
+                <a:off x="4713694" y="2058702"/>
+                <a:ext cx="712054" cy="307777"/>
+              </a:xfrm>
+              <a:prstGeom prst="rect">
+                <a:avLst/>
+              </a:prstGeom>
+            </p:spPr>
+            <p:txBody>
+              <a:bodyPr wrap="square">
+                <a:spAutoFit/>
+              </a:bodyPr>
+              <a:lstStyle/>
+              <a:p>
+                <a:pPr/>
+                <a14:m>
+                  <m:oMathPara xmlns:m="http://schemas.openxmlformats.org/officeDocument/2006/math">
+                    <m:oMathParaPr>
+                      <m:jc m:val="centerGroup"/>
+                    </m:oMathParaPr>
+                    <m:oMath xmlns:m="http://schemas.openxmlformats.org/officeDocument/2006/math">
+                      <m:r>
+                        <a:rPr lang="en-US" b="1" i="1" smtClean="0">
+                          <a:solidFill>
+                            <a:schemeClr val="bg1"/>
+                          </a:solidFill>
+                          <a:latin typeface="Cambria Math" panose="02040503050406030204" pitchFamily="18" charset="0"/>
+                        </a:rPr>
+                        <m:t>𝑶𝑳𝑺</m:t>
+                      </m:r>
+                    </m:oMath>
+                  </m:oMathPara>
+                </a14:m>
+                <a:endParaRPr lang="en-US" b="1" dirty="0">
+                  <a:solidFill>
+                    <a:schemeClr val="bg1"/>
+                  </a:solidFill>
+                </a:endParaRPr>
+              </a:p>
+            </p:txBody>
+          </p:sp>
+        </mc:Choice>
+        <mc:Fallback>
+          <p:sp>
+            <p:nvSpPr>
+              <p:cNvPr id="22" name="Rectangle 21">
+                <a:extLst>
+                  <a:ext uri="{FF2B5EF4-FFF2-40B4-BE49-F238E27FC236}">
+                    <a16:creationId xmlns:a16="http://schemas.microsoft.com/office/drawing/2014/main" id="{8FE68FC6-7C59-D81E-E09F-B84F38B28C8F}"/>
+                  </a:ext>
+                </a:extLst>
+              </p:cNvPr>
+              <p:cNvSpPr>
+                <a:spLocks noRot="1" noChangeAspect="1" noMove="1" noResize="1" noEditPoints="1" noAdjustHandles="1" noChangeArrowheads="1" noChangeShapeType="1" noTextEdit="1"/>
+              </p:cNvSpPr>
+              <p:nvPr/>
+            </p:nvSpPr>
+            <p:spPr>
+              <a:xfrm>
+                <a:off x="4713694" y="2058702"/>
+                <a:ext cx="712054" cy="307777"/>
+              </a:xfrm>
+              <a:prstGeom prst="rect">
+                <a:avLst/>
+              </a:prstGeom>
+              <a:blipFill>
+                <a:blip r:embed="rId3"/>
+                <a:stretch>
+                  <a:fillRect/>
+                </a:stretch>
+              </a:blipFill>
+            </p:spPr>
+            <p:txBody>
+              <a:bodyPr/>
+              <a:lstStyle/>
+              <a:p>
+                <a:r>
+                  <a:rPr lang="en-US">
+                    <a:noFill/>
+                  </a:rPr>
+                  <a:t> </a:t>
+                </a:r>
+              </a:p>
+            </p:txBody>
+          </p:sp>
+        </mc:Fallback>
+      </mc:AlternateContent>
+      <p:sp>
+        <p:nvSpPr>
+          <p:cNvPr id="24" name="Rectangle 23">
+            <a:extLst>
+              <a:ext uri="{FF2B5EF4-FFF2-40B4-BE49-F238E27FC236}">
+                <a16:creationId xmlns:a16="http://schemas.microsoft.com/office/drawing/2014/main" id="{40C7ED7A-DFC6-3D6A-D59E-2E018B8DDA44}"/>
+              </a:ext>
+            </a:extLst>
+          </p:cNvPr>
+          <p:cNvSpPr>
+            <a:spLocks noChangeAspect="1"/>
+          </p:cNvSpPr>
+          <p:nvPr/>
+        </p:nvSpPr>
+        <p:spPr>
+          <a:xfrm>
+            <a:off x="2875481" y="1960004"/>
+            <a:ext cx="1121891" cy="634950"/>
+          </a:xfrm>
+          <a:prstGeom prst="rect">
+            <a:avLst/>
+          </a:prstGeom>
+        </p:spPr>
+        <p:style>
+          <a:lnRef idx="1">
+            <a:schemeClr val="accent1"/>
+          </a:lnRef>
+          <a:fillRef idx="3">
+            <a:schemeClr val="accent1"/>
+          </a:fillRef>
+          <a:effectRef idx="2">
+            <a:schemeClr val="accent1"/>
+          </a:effectRef>
+          <a:fontRef idx="minor">
+            <a:schemeClr val="lt1"/>
+          </a:fontRef>
+        </p:style>
+        <p:txBody>
+          <a:bodyPr rtlCol="0" anchor="ctr"/>
+          <a:lstStyle/>
+          <a:p>
+            <a:pPr algn="ctr"/>
+            <a:r>
+              <a:rPr lang="en-US" sz="1600" dirty="0"/>
+              <a:t>Controller</a:t>
+            </a:r>
+          </a:p>
+        </p:txBody>
+      </p:sp>
+      <p:cxnSp>
+        <p:nvCxnSpPr>
+          <p:cNvPr id="25" name="Straight Arrow Connector 24">
+            <a:extLst>
+              <a:ext uri="{FF2B5EF4-FFF2-40B4-BE49-F238E27FC236}">
+                <a16:creationId xmlns:a16="http://schemas.microsoft.com/office/drawing/2014/main" id="{54D8E29B-F7CD-C5E8-8EF7-128F7D47778E}"/>
+              </a:ext>
+            </a:extLst>
+          </p:cNvPr>
+          <p:cNvCxnSpPr>
+            <a:cxnSpLocks/>
+          </p:cNvCxnSpPr>
+          <p:nvPr/>
+        </p:nvCxnSpPr>
+        <p:spPr>
+          <a:xfrm flipV="1">
+            <a:off x="1519870" y="2308054"/>
+            <a:ext cx="644896" cy="3806"/>
+          </a:xfrm>
+          <a:prstGeom prst="straightConnector1">
+            <a:avLst/>
+          </a:prstGeom>
+          <a:ln>
+            <a:tailEnd type="triangle" w="lg" len="lg"/>
+          </a:ln>
+          <a:effectLst>
+            <a:outerShdw dist="20000" sx="1000" sy="1000" rotWithShape="0">
+              <a:srgbClr val="000000"/>
+            </a:outerShdw>
+          </a:effectLst>
+        </p:spPr>
+        <p:style>
+          <a:lnRef idx="2">
+            <a:schemeClr val="accent1"/>
+          </a:lnRef>
+          <a:fillRef idx="0">
+            <a:schemeClr val="accent1"/>
+          </a:fillRef>
+          <a:effectRef idx="1">
+            <a:schemeClr val="accent1"/>
+          </a:effectRef>
+          <a:fontRef idx="minor">
+            <a:schemeClr val="tx1"/>
+          </a:fontRef>
+        </p:style>
+      </p:cxnSp>
+      <p:sp>
+        <p:nvSpPr>
+          <p:cNvPr id="26" name="Oval 25">
+            <a:extLst>
+              <a:ext uri="{FF2B5EF4-FFF2-40B4-BE49-F238E27FC236}">
+                <a16:creationId xmlns:a16="http://schemas.microsoft.com/office/drawing/2014/main" id="{03213185-C8D3-D0BE-A3D3-91BF4A667ED7}"/>
+              </a:ext>
+            </a:extLst>
+          </p:cNvPr>
+          <p:cNvSpPr/>
+          <p:nvPr/>
+        </p:nvSpPr>
+        <p:spPr>
+          <a:xfrm>
+            <a:off x="2183980" y="2134930"/>
+            <a:ext cx="301841" cy="301840"/>
+          </a:xfrm>
+          <a:prstGeom prst="ellipse">
+            <a:avLst/>
+          </a:prstGeom>
+        </p:spPr>
+        <p:style>
+          <a:lnRef idx="1">
+            <a:schemeClr val="accent1"/>
+          </a:lnRef>
+          <a:fillRef idx="3">
+            <a:schemeClr val="accent1"/>
+          </a:fillRef>
+          <a:effectRef idx="2">
+            <a:schemeClr val="accent1"/>
+          </a:effectRef>
+          <a:fontRef idx="minor">
+            <a:schemeClr val="lt1"/>
+          </a:fontRef>
+        </p:style>
+        <p:txBody>
+          <a:bodyPr rtlCol="0" anchor="ctr"/>
+          <a:lstStyle/>
+          <a:p>
+            <a:pPr algn="ctr"/>
+            <a:r>
+              <a:rPr lang="en-US" dirty="0"/>
+              <a:t>+</a:t>
+            </a:r>
+          </a:p>
+        </p:txBody>
+      </p:sp>
+      <p:cxnSp>
+        <p:nvCxnSpPr>
+          <p:cNvPr id="27" name="Straight Arrow Connector 26">
+            <a:extLst>
+              <a:ext uri="{FF2B5EF4-FFF2-40B4-BE49-F238E27FC236}">
+                <a16:creationId xmlns:a16="http://schemas.microsoft.com/office/drawing/2014/main" id="{4A6B626E-5B46-1EFB-DDF4-87250BA11517}"/>
+              </a:ext>
+            </a:extLst>
+          </p:cNvPr>
+          <p:cNvCxnSpPr>
+            <a:cxnSpLocks/>
+            <a:stCxn id="26" idx="6"/>
+            <a:endCxn id="24" idx="1"/>
+          </p:cNvCxnSpPr>
+          <p:nvPr/>
+        </p:nvCxnSpPr>
+        <p:spPr>
+          <a:xfrm flipV="1">
+            <a:off x="2485821" y="2277479"/>
+            <a:ext cx="389660" cy="8371"/>
+          </a:xfrm>
+          <a:prstGeom prst="straightConnector1">
+            <a:avLst/>
+          </a:prstGeom>
+          <a:ln>
+            <a:tailEnd type="triangle" w="lg" len="lg"/>
+          </a:ln>
+          <a:effectLst>
+            <a:outerShdw dist="20000" sx="1000" sy="1000" rotWithShape="0">
+              <a:srgbClr val="000000"/>
+            </a:outerShdw>
+          </a:effectLst>
+        </p:spPr>
+        <p:style>
+          <a:lnRef idx="2">
+            <a:schemeClr val="accent1"/>
+          </a:lnRef>
+          <a:fillRef idx="0">
+            <a:schemeClr val="accent1"/>
+          </a:fillRef>
+          <a:effectRef idx="1">
+            <a:schemeClr val="accent1"/>
+          </a:effectRef>
+          <a:fontRef idx="minor">
+            <a:schemeClr val="tx1"/>
+          </a:fontRef>
+        </p:style>
+      </p:cxnSp>
+      <mc:AlternateContent xmlns:mc="http://schemas.openxmlformats.org/markup-compatibility/2006">
+        <mc:Choice xmlns:a14="http://schemas.microsoft.com/office/drawing/2010/main" Requires="a14">
+          <p:sp>
+            <p:nvSpPr>
+              <p:cNvPr id="28" name="TextBox 27">
+                <a:extLst>
+                  <a:ext uri="{FF2B5EF4-FFF2-40B4-BE49-F238E27FC236}">
+                    <a16:creationId xmlns:a16="http://schemas.microsoft.com/office/drawing/2014/main" id="{F1DBB7EF-B74B-BA24-5E61-0CBE58FA7906}"/>
+                  </a:ext>
+                </a:extLst>
+              </p:cNvPr>
+              <p:cNvSpPr txBox="1"/>
+              <p:nvPr/>
+            </p:nvSpPr>
+            <p:spPr>
+              <a:xfrm>
+                <a:off x="2067391" y="2608513"/>
+                <a:ext cx="237244" cy="276999"/>
+              </a:xfrm>
+              <a:prstGeom prst="rect">
+                <a:avLst/>
+              </a:prstGeom>
+              <a:noFill/>
+            </p:spPr>
+            <p:txBody>
+              <a:bodyPr wrap="none" lIns="0" tIns="0" rIns="0" bIns="0" rtlCol="0">
+                <a:spAutoFit/>
+              </a:bodyPr>
+              <a:lstStyle/>
+              <a:p>
+                <a:pPr/>
+                <a14:m>
+                  <m:oMathPara xmlns:m="http://schemas.openxmlformats.org/officeDocument/2006/math">
+                    <m:oMathParaPr>
+                      <m:jc m:val="centerGroup"/>
+                    </m:oMathParaPr>
+                    <m:oMath xmlns:m="http://schemas.openxmlformats.org/officeDocument/2006/math">
+                      <m:r>
+                        <a:rPr lang="en-US" b="0" i="1" smtClean="0">
+                          <a:latin typeface="Cambria Math" panose="02040503050406030204" pitchFamily="18" charset="0"/>
+                        </a:rPr>
+                        <m:t>−</m:t>
+                      </m:r>
+                    </m:oMath>
+                  </m:oMathPara>
+                </a14:m>
+                <a:endParaRPr lang="en-US" dirty="0"/>
+              </a:p>
+            </p:txBody>
+          </p:sp>
+        </mc:Choice>
+        <mc:Fallback>
+          <p:sp>
+            <p:nvSpPr>
+              <p:cNvPr id="28" name="TextBox 27">
+                <a:extLst>
+                  <a:ext uri="{FF2B5EF4-FFF2-40B4-BE49-F238E27FC236}">
+                    <a16:creationId xmlns:a16="http://schemas.microsoft.com/office/drawing/2014/main" id="{F1DBB7EF-B74B-BA24-5E61-0CBE58FA7906}"/>
+                  </a:ext>
+                </a:extLst>
+              </p:cNvPr>
+              <p:cNvSpPr txBox="1">
+                <a:spLocks noRot="1" noChangeAspect="1" noMove="1" noResize="1" noEditPoints="1" noAdjustHandles="1" noChangeArrowheads="1" noChangeShapeType="1" noTextEdit="1"/>
+              </p:cNvSpPr>
+              <p:nvPr/>
+            </p:nvSpPr>
+            <p:spPr>
+              <a:xfrm>
+                <a:off x="2067391" y="2608513"/>
+                <a:ext cx="237244" cy="276999"/>
+              </a:xfrm>
+              <a:prstGeom prst="rect">
+                <a:avLst/>
+              </a:prstGeom>
+              <a:blipFill>
+                <a:blip r:embed="rId4"/>
+                <a:stretch>
+                  <a:fillRect/>
+                </a:stretch>
+              </a:blipFill>
+            </p:spPr>
+            <p:txBody>
+              <a:bodyPr/>
+              <a:lstStyle/>
+              <a:p>
+                <a:r>
+                  <a:rPr lang="en-US">
+                    <a:noFill/>
+                  </a:rPr>
+                  <a:t> </a:t>
+                </a:r>
+              </a:p>
+            </p:txBody>
+          </p:sp>
+        </mc:Fallback>
+      </mc:AlternateContent>
+      <mc:AlternateContent xmlns:mc="http://schemas.openxmlformats.org/markup-compatibility/2006">
+        <mc:Choice xmlns:a14="http://schemas.microsoft.com/office/drawing/2010/main" Requires="a14">
+          <p:sp>
+            <p:nvSpPr>
+              <p:cNvPr id="29" name="Rectangle 28">
+                <a:extLst>
+                  <a:ext uri="{FF2B5EF4-FFF2-40B4-BE49-F238E27FC236}">
+                    <a16:creationId xmlns:a16="http://schemas.microsoft.com/office/drawing/2014/main" id="{B9197F54-B0CE-A3C8-7440-01E5C2730CC4}"/>
+                  </a:ext>
+                </a:extLst>
+              </p:cNvPr>
+              <p:cNvSpPr/>
+              <p:nvPr/>
+            </p:nvSpPr>
+            <p:spPr>
+              <a:xfrm>
+                <a:off x="1413557" y="1842182"/>
+                <a:ext cx="601318" cy="338554"/>
+              </a:xfrm>
+              <a:prstGeom prst="rect">
+                <a:avLst/>
+              </a:prstGeom>
+            </p:spPr>
+            <p:txBody>
+              <a:bodyPr wrap="none">
+                <a:spAutoFit/>
+              </a:bodyPr>
+              <a:lstStyle/>
+              <a:p>
+                <a:pPr/>
+                <a14:m>
+                  <m:oMathPara xmlns:m="http://schemas.openxmlformats.org/officeDocument/2006/math">
+                    <m:oMathParaPr>
+                      <m:jc m:val="centerGroup"/>
+                    </m:oMathParaPr>
+                    <m:oMath xmlns:m="http://schemas.openxmlformats.org/officeDocument/2006/math">
+                      <m:r>
+                        <a:rPr lang="en-US" sz="1600" b="0" i="1" smtClean="0">
+                          <a:solidFill>
+                            <a:schemeClr val="tx1"/>
+                          </a:solidFill>
+                          <a:latin typeface="Cambria Math" panose="02040503050406030204" pitchFamily="18" charset="0"/>
+                        </a:rPr>
+                        <m:t>𝑟</m:t>
+                      </m:r>
+                      <m:r>
+                        <a:rPr lang="en-US" sz="1600" b="0" i="1" smtClean="0">
+                          <a:solidFill>
+                            <a:schemeClr val="tx1"/>
+                          </a:solidFill>
+                          <a:latin typeface="Cambria Math" panose="02040503050406030204" pitchFamily="18" charset="0"/>
+                        </a:rPr>
+                        <m:t>(</m:t>
+                      </m:r>
+                      <m:r>
+                        <a:rPr lang="en-US" sz="1600" b="0" i="1" smtClean="0">
+                          <a:solidFill>
+                            <a:schemeClr val="tx1"/>
+                          </a:solidFill>
+                          <a:latin typeface="Cambria Math" panose="02040503050406030204" pitchFamily="18" charset="0"/>
+                        </a:rPr>
+                        <m:t>𝑡</m:t>
+                      </m:r>
+                      <m:r>
+                        <a:rPr lang="en-US" sz="1600" b="0" i="1" smtClean="0">
+                          <a:solidFill>
+                            <a:schemeClr val="tx1"/>
+                          </a:solidFill>
+                          <a:latin typeface="Cambria Math" panose="02040503050406030204" pitchFamily="18" charset="0"/>
+                        </a:rPr>
+                        <m:t>)</m:t>
+                      </m:r>
+                    </m:oMath>
+                  </m:oMathPara>
+                </a14:m>
+                <a:endParaRPr lang="en-US" sz="1600" dirty="0">
+                  <a:solidFill>
+                    <a:schemeClr val="tx1"/>
+                  </a:solidFill>
+                </a:endParaRPr>
+              </a:p>
+            </p:txBody>
+          </p:sp>
+        </mc:Choice>
+        <mc:Fallback>
+          <p:sp>
+            <p:nvSpPr>
+              <p:cNvPr id="29" name="Rectangle 28">
+                <a:extLst>
+                  <a:ext uri="{FF2B5EF4-FFF2-40B4-BE49-F238E27FC236}">
+                    <a16:creationId xmlns:a16="http://schemas.microsoft.com/office/drawing/2014/main" id="{B9197F54-B0CE-A3C8-7440-01E5C2730CC4}"/>
+                  </a:ext>
+                </a:extLst>
+              </p:cNvPr>
+              <p:cNvSpPr>
+                <a:spLocks noRot="1" noChangeAspect="1" noMove="1" noResize="1" noEditPoints="1" noAdjustHandles="1" noChangeArrowheads="1" noChangeShapeType="1" noTextEdit="1"/>
+              </p:cNvSpPr>
+              <p:nvPr/>
+            </p:nvSpPr>
+            <p:spPr>
+              <a:xfrm>
+                <a:off x="1413557" y="1842182"/>
+                <a:ext cx="601318" cy="338554"/>
+              </a:xfrm>
+              <a:prstGeom prst="rect">
+                <a:avLst/>
+              </a:prstGeom>
+              <a:blipFill>
+                <a:blip r:embed="rId5"/>
+                <a:stretch>
+                  <a:fillRect b="-17857"/>
+                </a:stretch>
+              </a:blipFill>
+            </p:spPr>
+            <p:txBody>
+              <a:bodyPr/>
+              <a:lstStyle/>
+              <a:p>
+                <a:r>
+                  <a:rPr lang="en-US">
+                    <a:noFill/>
+                  </a:rPr>
+                  <a:t> </a:t>
+                </a:r>
+              </a:p>
+            </p:txBody>
+          </p:sp>
+        </mc:Fallback>
+      </mc:AlternateContent>
+      <mc:AlternateContent xmlns:mc="http://schemas.openxmlformats.org/markup-compatibility/2006">
+        <mc:Choice xmlns:a14="http://schemas.microsoft.com/office/drawing/2010/main" Requires="a14">
+          <p:sp>
+            <p:nvSpPr>
+              <p:cNvPr id="30" name="Rectangle 29">
+                <a:extLst>
+                  <a:ext uri="{FF2B5EF4-FFF2-40B4-BE49-F238E27FC236}">
+                    <a16:creationId xmlns:a16="http://schemas.microsoft.com/office/drawing/2014/main" id="{02608FD8-E9CA-6F77-C3B1-DF27551CFCE7}"/>
+                  </a:ext>
+                </a:extLst>
+              </p:cNvPr>
+              <p:cNvSpPr/>
+              <p:nvPr/>
+            </p:nvSpPr>
+            <p:spPr>
+              <a:xfrm>
+                <a:off x="2325778" y="1801318"/>
+                <a:ext cx="606127" cy="338554"/>
+              </a:xfrm>
+              <a:prstGeom prst="rect">
+                <a:avLst/>
+              </a:prstGeom>
+            </p:spPr>
+            <p:txBody>
+              <a:bodyPr wrap="none">
+                <a:spAutoFit/>
+              </a:bodyPr>
+              <a:lstStyle/>
+              <a:p>
+                <a:pPr/>
+                <a14:m>
+                  <m:oMathPara xmlns:m="http://schemas.openxmlformats.org/officeDocument/2006/math">
+                    <m:oMathParaPr>
+                      <m:jc m:val="centerGroup"/>
+                    </m:oMathParaPr>
+                    <m:oMath xmlns:m="http://schemas.openxmlformats.org/officeDocument/2006/math">
+                      <m:r>
+                        <a:rPr lang="en-US" sz="1600" b="0" i="1" smtClean="0">
+                          <a:solidFill>
+                            <a:schemeClr val="tx1"/>
+                          </a:solidFill>
+                          <a:latin typeface="Cambria Math" panose="02040503050406030204" pitchFamily="18" charset="0"/>
+                        </a:rPr>
+                        <m:t>𝑒</m:t>
+                      </m:r>
+                      <m:r>
+                        <a:rPr lang="en-US" sz="1600" b="0" i="1" smtClean="0">
+                          <a:solidFill>
+                            <a:schemeClr val="tx1"/>
+                          </a:solidFill>
+                          <a:latin typeface="Cambria Math" panose="02040503050406030204" pitchFamily="18" charset="0"/>
+                        </a:rPr>
+                        <m:t>(</m:t>
+                      </m:r>
+                      <m:r>
+                        <a:rPr lang="en-US" sz="1600" b="0" i="1" smtClean="0">
+                          <a:solidFill>
+                            <a:schemeClr val="tx1"/>
+                          </a:solidFill>
+                          <a:latin typeface="Cambria Math" panose="02040503050406030204" pitchFamily="18" charset="0"/>
+                        </a:rPr>
+                        <m:t>𝑡</m:t>
+                      </m:r>
+                      <m:r>
+                        <a:rPr lang="en-US" sz="1600" b="0" i="1" smtClean="0">
+                          <a:solidFill>
+                            <a:schemeClr val="tx1"/>
+                          </a:solidFill>
+                          <a:latin typeface="Cambria Math" panose="02040503050406030204" pitchFamily="18" charset="0"/>
+                        </a:rPr>
+                        <m:t>)</m:t>
+                      </m:r>
+                    </m:oMath>
+                  </m:oMathPara>
+                </a14:m>
+                <a:endParaRPr lang="en-US" sz="1600" dirty="0">
+                  <a:solidFill>
+                    <a:schemeClr val="tx1"/>
+                  </a:solidFill>
+                </a:endParaRPr>
+              </a:p>
+            </p:txBody>
+          </p:sp>
+        </mc:Choice>
+        <mc:Fallback>
+          <p:sp>
+            <p:nvSpPr>
+              <p:cNvPr id="30" name="Rectangle 29">
+                <a:extLst>
+                  <a:ext uri="{FF2B5EF4-FFF2-40B4-BE49-F238E27FC236}">
+                    <a16:creationId xmlns:a16="http://schemas.microsoft.com/office/drawing/2014/main" id="{02608FD8-E9CA-6F77-C3B1-DF27551CFCE7}"/>
+                  </a:ext>
+                </a:extLst>
+              </p:cNvPr>
+              <p:cNvSpPr>
+                <a:spLocks noRot="1" noChangeAspect="1" noMove="1" noResize="1" noEditPoints="1" noAdjustHandles="1" noChangeArrowheads="1" noChangeShapeType="1" noTextEdit="1"/>
+              </p:cNvSpPr>
+              <p:nvPr/>
+            </p:nvSpPr>
+            <p:spPr>
+              <a:xfrm>
+                <a:off x="2325778" y="1801318"/>
+                <a:ext cx="606127" cy="338554"/>
+              </a:xfrm>
+              <a:prstGeom prst="rect">
+                <a:avLst/>
+              </a:prstGeom>
+              <a:blipFill>
+                <a:blip r:embed="rId6"/>
+                <a:stretch>
+                  <a:fillRect b="-17857"/>
+                </a:stretch>
+              </a:blipFill>
+            </p:spPr>
+            <p:txBody>
+              <a:bodyPr/>
+              <a:lstStyle/>
+              <a:p>
+                <a:r>
+                  <a:rPr lang="en-US">
+                    <a:noFill/>
+                  </a:rPr>
+                  <a:t> </a:t>
+                </a:r>
+              </a:p>
+            </p:txBody>
+          </p:sp>
+        </mc:Fallback>
+      </mc:AlternateContent>
+      <mc:AlternateContent xmlns:mc="http://schemas.openxmlformats.org/markup-compatibility/2006">
+        <mc:Choice xmlns:a14="http://schemas.microsoft.com/office/drawing/2010/main" Requires="a14">
+          <p:sp>
+            <p:nvSpPr>
+              <p:cNvPr id="31" name="Rectangle 30">
+                <a:extLst>
+                  <a:ext uri="{FF2B5EF4-FFF2-40B4-BE49-F238E27FC236}">
+                    <a16:creationId xmlns:a16="http://schemas.microsoft.com/office/drawing/2014/main" id="{0C610E27-5E18-8CED-57B3-FE48529F2C0C}"/>
+                  </a:ext>
+                </a:extLst>
+              </p:cNvPr>
+              <p:cNvSpPr/>
+              <p:nvPr/>
+            </p:nvSpPr>
+            <p:spPr>
+              <a:xfrm>
+                <a:off x="4033500" y="1856532"/>
+                <a:ext cx="716478" cy="338554"/>
+              </a:xfrm>
+              <a:prstGeom prst="rect">
+                <a:avLst/>
+              </a:prstGeom>
+            </p:spPr>
+            <p:txBody>
+              <a:bodyPr wrap="square">
+                <a:spAutoFit/>
+              </a:bodyPr>
+              <a:lstStyle/>
+              <a:p>
+                <a:pPr/>
+                <a14:m>
+                  <m:oMathPara xmlns:m="http://schemas.openxmlformats.org/officeDocument/2006/math">
+                    <m:oMathParaPr>
+                      <m:jc m:val="centerGroup"/>
+                    </m:oMathParaPr>
+                    <m:oMath xmlns:m="http://schemas.openxmlformats.org/officeDocument/2006/math">
+                      <m:r>
+                        <a:rPr lang="en-US" sz="1600" b="0" i="1" smtClean="0">
+                          <a:solidFill>
+                            <a:schemeClr val="tx1"/>
+                          </a:solidFill>
+                          <a:latin typeface="Cambria Math" panose="02040503050406030204" pitchFamily="18" charset="0"/>
+                        </a:rPr>
+                        <m:t>𝑢</m:t>
+                      </m:r>
+                      <m:r>
+                        <a:rPr lang="en-US" sz="1600" b="0" i="1" smtClean="0">
+                          <a:solidFill>
+                            <a:schemeClr val="tx1"/>
+                          </a:solidFill>
+                          <a:latin typeface="Cambria Math" panose="02040503050406030204" pitchFamily="18" charset="0"/>
+                        </a:rPr>
+                        <m:t>(</m:t>
+                      </m:r>
+                      <m:r>
+                        <a:rPr lang="en-US" sz="1600" b="0" i="1" smtClean="0">
+                          <a:solidFill>
+                            <a:schemeClr val="tx1"/>
+                          </a:solidFill>
+                          <a:latin typeface="Cambria Math" panose="02040503050406030204" pitchFamily="18" charset="0"/>
+                        </a:rPr>
+                        <m:t>𝑡</m:t>
+                      </m:r>
+                      <m:r>
+                        <a:rPr lang="en-US" sz="1600" b="0" i="1" smtClean="0">
+                          <a:solidFill>
+                            <a:schemeClr val="tx1"/>
+                          </a:solidFill>
+                          <a:latin typeface="Cambria Math" panose="02040503050406030204" pitchFamily="18" charset="0"/>
+                        </a:rPr>
+                        <m:t>)</m:t>
+                      </m:r>
+                    </m:oMath>
+                  </m:oMathPara>
+                </a14:m>
+                <a:endParaRPr lang="en-US" sz="1600" dirty="0">
+                  <a:solidFill>
+                    <a:schemeClr val="tx1"/>
+                  </a:solidFill>
+                </a:endParaRPr>
+              </a:p>
+            </p:txBody>
+          </p:sp>
+        </mc:Choice>
+        <mc:Fallback>
+          <p:sp>
+            <p:nvSpPr>
+              <p:cNvPr id="31" name="Rectangle 30">
+                <a:extLst>
+                  <a:ext uri="{FF2B5EF4-FFF2-40B4-BE49-F238E27FC236}">
+                    <a16:creationId xmlns:a16="http://schemas.microsoft.com/office/drawing/2014/main" id="{0C610E27-5E18-8CED-57B3-FE48529F2C0C}"/>
+                  </a:ext>
+                </a:extLst>
+              </p:cNvPr>
+              <p:cNvSpPr>
+                <a:spLocks noRot="1" noChangeAspect="1" noMove="1" noResize="1" noEditPoints="1" noAdjustHandles="1" noChangeArrowheads="1" noChangeShapeType="1" noTextEdit="1"/>
+              </p:cNvSpPr>
+              <p:nvPr/>
+            </p:nvSpPr>
+            <p:spPr>
+              <a:xfrm>
+                <a:off x="4033500" y="1856532"/>
+                <a:ext cx="716478" cy="338554"/>
+              </a:xfrm>
+              <a:prstGeom prst="rect">
+                <a:avLst/>
+              </a:prstGeom>
+              <a:blipFill>
+                <a:blip r:embed="rId7"/>
+                <a:stretch>
+                  <a:fillRect b="-18519"/>
+                </a:stretch>
+              </a:blipFill>
+            </p:spPr>
+            <p:txBody>
+              <a:bodyPr/>
+              <a:lstStyle/>
+              <a:p>
+                <a:r>
+                  <a:rPr lang="en-US">
+                    <a:noFill/>
+                  </a:rPr>
+                  <a:t> </a:t>
+                </a:r>
+              </a:p>
+            </p:txBody>
+          </p:sp>
+        </mc:Fallback>
+      </mc:AlternateContent>
+      <mc:AlternateContent xmlns:mc="http://schemas.openxmlformats.org/markup-compatibility/2006">
+        <mc:Choice xmlns:a14="http://schemas.microsoft.com/office/drawing/2010/main" Requires="a14">
+          <p:sp>
+            <p:nvSpPr>
+              <p:cNvPr id="32" name="Rectangle 31">
+                <a:extLst>
+                  <a:ext uri="{FF2B5EF4-FFF2-40B4-BE49-F238E27FC236}">
+                    <a16:creationId xmlns:a16="http://schemas.microsoft.com/office/drawing/2014/main" id="{FA5FC40F-16F0-5AC2-7AB6-6713B83BF5D4}"/>
+                  </a:ext>
+                </a:extLst>
+              </p:cNvPr>
+              <p:cNvSpPr/>
+              <p:nvPr/>
+            </p:nvSpPr>
+            <p:spPr>
+              <a:xfrm>
+                <a:off x="5360363" y="1791241"/>
+                <a:ext cx="716478" cy="338554"/>
+              </a:xfrm>
+              <a:prstGeom prst="rect">
+                <a:avLst/>
+              </a:prstGeom>
+            </p:spPr>
+            <p:txBody>
+              <a:bodyPr wrap="square">
+                <a:spAutoFit/>
+              </a:bodyPr>
+              <a:lstStyle/>
+              <a:p>
+                <a:pPr/>
+                <a14:m>
+                  <m:oMathPara xmlns:m="http://schemas.openxmlformats.org/officeDocument/2006/math">
+                    <m:oMathParaPr>
+                      <m:jc m:val="centerGroup"/>
+                    </m:oMathParaPr>
+                    <m:oMath xmlns:m="http://schemas.openxmlformats.org/officeDocument/2006/math">
+                      <m:r>
+                        <a:rPr lang="en-US" sz="1600" b="0" i="1" smtClean="0">
+                          <a:solidFill>
+                            <a:schemeClr val="tx1"/>
+                          </a:solidFill>
+                          <a:latin typeface="Cambria Math" panose="02040503050406030204" pitchFamily="18" charset="0"/>
+                        </a:rPr>
+                        <m:t>𝑦</m:t>
+                      </m:r>
+                      <m:r>
+                        <a:rPr lang="en-US" sz="1600" b="0" i="1" smtClean="0">
+                          <a:solidFill>
+                            <a:schemeClr val="tx1"/>
+                          </a:solidFill>
+                          <a:latin typeface="Cambria Math" panose="02040503050406030204" pitchFamily="18" charset="0"/>
+                        </a:rPr>
+                        <m:t>(</m:t>
+                      </m:r>
+                      <m:r>
+                        <a:rPr lang="en-US" sz="1600" b="0" i="1" smtClean="0">
+                          <a:solidFill>
+                            <a:schemeClr val="tx1"/>
+                          </a:solidFill>
+                          <a:latin typeface="Cambria Math" panose="02040503050406030204" pitchFamily="18" charset="0"/>
+                        </a:rPr>
+                        <m:t>𝑡</m:t>
+                      </m:r>
+                      <m:r>
+                        <a:rPr lang="en-US" sz="1600" b="0" i="1" smtClean="0">
+                          <a:solidFill>
+                            <a:schemeClr val="tx1"/>
+                          </a:solidFill>
+                          <a:latin typeface="Cambria Math" panose="02040503050406030204" pitchFamily="18" charset="0"/>
+                        </a:rPr>
+                        <m:t>)</m:t>
+                      </m:r>
+                    </m:oMath>
+                  </m:oMathPara>
+                </a14:m>
+                <a:endParaRPr lang="en-US" sz="1600" dirty="0">
+                  <a:solidFill>
+                    <a:schemeClr val="tx1"/>
+                  </a:solidFill>
+                </a:endParaRPr>
+              </a:p>
+            </p:txBody>
+          </p:sp>
+        </mc:Choice>
+        <mc:Fallback>
+          <p:sp>
+            <p:nvSpPr>
+              <p:cNvPr id="32" name="Rectangle 31">
+                <a:extLst>
+                  <a:ext uri="{FF2B5EF4-FFF2-40B4-BE49-F238E27FC236}">
+                    <a16:creationId xmlns:a16="http://schemas.microsoft.com/office/drawing/2014/main" id="{FA5FC40F-16F0-5AC2-7AB6-6713B83BF5D4}"/>
+                  </a:ext>
+                </a:extLst>
+              </p:cNvPr>
+              <p:cNvSpPr>
+                <a:spLocks noRot="1" noChangeAspect="1" noMove="1" noResize="1" noEditPoints="1" noAdjustHandles="1" noChangeArrowheads="1" noChangeShapeType="1" noTextEdit="1"/>
+              </p:cNvSpPr>
+              <p:nvPr/>
+            </p:nvSpPr>
+            <p:spPr>
+              <a:xfrm>
+                <a:off x="5360363" y="1791241"/>
+                <a:ext cx="716478" cy="338554"/>
+              </a:xfrm>
+              <a:prstGeom prst="rect">
+                <a:avLst/>
+              </a:prstGeom>
+              <a:blipFill>
+                <a:blip r:embed="rId8"/>
+                <a:stretch>
+                  <a:fillRect b="-18519"/>
+                </a:stretch>
+              </a:blipFill>
+            </p:spPr>
+            <p:txBody>
+              <a:bodyPr/>
+              <a:lstStyle/>
+              <a:p>
+                <a:r>
+                  <a:rPr lang="en-US">
+                    <a:noFill/>
+                  </a:rPr>
+                  <a:t> </a:t>
+                </a:r>
+              </a:p>
+            </p:txBody>
+          </p:sp>
+        </mc:Fallback>
+      </mc:AlternateContent>
+      <p:sp>
+        <p:nvSpPr>
+          <p:cNvPr id="33" name="Oval 32">
+            <a:extLst>
+              <a:ext uri="{FF2B5EF4-FFF2-40B4-BE49-F238E27FC236}">
+                <a16:creationId xmlns:a16="http://schemas.microsoft.com/office/drawing/2014/main" id="{820343D9-0A2C-AB5E-85EB-E9D0521CFFE0}"/>
+              </a:ext>
+            </a:extLst>
+          </p:cNvPr>
+          <p:cNvSpPr>
+            <a:spLocks noChangeAspect="1"/>
+          </p:cNvSpPr>
+          <p:nvPr/>
+        </p:nvSpPr>
+        <p:spPr>
+          <a:xfrm>
+            <a:off x="6023447" y="2170663"/>
+            <a:ext cx="91440" cy="91440"/>
+          </a:xfrm>
+          <a:prstGeom prst="ellipse">
+            <a:avLst/>
+          </a:prstGeom>
+        </p:spPr>
+        <p:style>
+          <a:lnRef idx="1">
+            <a:schemeClr val="accent1"/>
+          </a:lnRef>
+          <a:fillRef idx="3">
+            <a:schemeClr val="accent1"/>
+          </a:fillRef>
+          <a:effectRef idx="2">
+            <a:schemeClr val="accent1"/>
+          </a:effectRef>
+          <a:fontRef idx="minor">
+            <a:schemeClr val="lt1"/>
+          </a:fontRef>
+        </p:style>
+        <p:txBody>
+          <a:bodyPr rtlCol="0" anchor="ctr"/>
+          <a:lstStyle/>
+          <a:p>
+            <a:pPr algn="ctr"/>
+            <a:endParaRPr lang="en-US" dirty="0"/>
+          </a:p>
+        </p:txBody>
+      </p:sp>
+      <p:cxnSp>
+        <p:nvCxnSpPr>
+          <p:cNvPr id="34" name="Straight Arrow Connector 33">
+            <a:extLst>
+              <a:ext uri="{FF2B5EF4-FFF2-40B4-BE49-F238E27FC236}">
+                <a16:creationId xmlns:a16="http://schemas.microsoft.com/office/drawing/2014/main" id="{957E875F-055F-3594-7957-97E7D7829CD6}"/>
+              </a:ext>
+            </a:extLst>
+          </p:cNvPr>
+          <p:cNvCxnSpPr>
+            <a:cxnSpLocks/>
+            <a:stCxn id="33" idx="6"/>
+          </p:cNvCxnSpPr>
+          <p:nvPr/>
+        </p:nvCxnSpPr>
+        <p:spPr>
+          <a:xfrm>
+            <a:off x="6114887" y="2216383"/>
+            <a:ext cx="679510" cy="0"/>
+          </a:xfrm>
+          <a:prstGeom prst="straightConnector1">
+            <a:avLst/>
+          </a:prstGeom>
+          <a:ln>
+            <a:tailEnd type="triangle" w="lg" len="lg"/>
+          </a:ln>
+          <a:effectLst>
+            <a:outerShdw dist="20000" sx="1000" sy="1000" rotWithShape="0">
+              <a:srgbClr val="000000"/>
+            </a:outerShdw>
+          </a:effectLst>
+        </p:spPr>
+        <p:style>
+          <a:lnRef idx="2">
+            <a:schemeClr val="accent1"/>
+          </a:lnRef>
+          <a:fillRef idx="0">
+            <a:schemeClr val="accent1"/>
+          </a:fillRef>
+          <a:effectRef idx="1">
+            <a:schemeClr val="accent1"/>
+          </a:effectRef>
+          <a:fontRef idx="minor">
+            <a:schemeClr val="tx1"/>
+          </a:fontRef>
+        </p:style>
+      </p:cxnSp>
+      <p:cxnSp>
+        <p:nvCxnSpPr>
+          <p:cNvPr id="35" name="Elbow Connector 34">
+            <a:extLst>
+              <a:ext uri="{FF2B5EF4-FFF2-40B4-BE49-F238E27FC236}">
+                <a16:creationId xmlns:a16="http://schemas.microsoft.com/office/drawing/2014/main" id="{A0C3FDDD-00BA-C6F0-6615-AA6D5A1D91F4}"/>
+              </a:ext>
+            </a:extLst>
+          </p:cNvPr>
+          <p:cNvCxnSpPr>
+            <a:cxnSpLocks/>
+            <a:stCxn id="33" idx="4"/>
+            <a:endCxn id="26" idx="4"/>
+          </p:cNvCxnSpPr>
+          <p:nvPr/>
+        </p:nvCxnSpPr>
+        <p:spPr>
+          <a:xfrm rot="5400000">
+            <a:off x="4114701" y="482303"/>
+            <a:ext cx="174667" cy="3734266"/>
+          </a:xfrm>
+          <a:prstGeom prst="bentConnector3">
+            <a:avLst>
+              <a:gd name="adj1" fmla="val 394175"/>
+            </a:avLst>
+          </a:prstGeom>
+          <a:ln w="19050">
+            <a:tailEnd type="triangle" w="lg" len="lg"/>
+          </a:ln>
+          <a:effectLst>
+            <a:outerShdw dist="20000" sx="1000" sy="1000" rotWithShape="0">
+              <a:srgbClr val="000000"/>
+            </a:outerShdw>
+          </a:effectLst>
+        </p:spPr>
+        <p:style>
+          <a:lnRef idx="2">
+            <a:schemeClr val="accent1"/>
+          </a:lnRef>
+          <a:fillRef idx="0">
+            <a:schemeClr val="accent1"/>
+          </a:fillRef>
+          <a:effectRef idx="1">
+            <a:schemeClr val="accent1"/>
+          </a:effectRef>
+          <a:fontRef idx="minor">
+            <a:schemeClr val="tx1"/>
+          </a:fontRef>
+        </p:style>
+      </p:cxnSp>
+      <p:sp>
+        <p:nvSpPr>
+          <p:cNvPr id="36" name="Rectangle 35">
+            <a:extLst>
+              <a:ext uri="{FF2B5EF4-FFF2-40B4-BE49-F238E27FC236}">
+                <a16:creationId xmlns:a16="http://schemas.microsoft.com/office/drawing/2014/main" id="{58625E86-E398-C52C-026D-B3636FC46CB7}"/>
+              </a:ext>
+            </a:extLst>
+          </p:cNvPr>
+          <p:cNvSpPr>
+            <a:spLocks noChangeAspect="1"/>
+          </p:cNvSpPr>
+          <p:nvPr/>
+        </p:nvSpPr>
+        <p:spPr>
+          <a:xfrm>
+            <a:off x="5935649" y="3794829"/>
+            <a:ext cx="643565" cy="634949"/>
+          </a:xfrm>
+          <a:prstGeom prst="rect">
+            <a:avLst/>
+          </a:prstGeom>
+        </p:spPr>
+        <p:style>
+          <a:lnRef idx="1">
+            <a:schemeClr val="accent1"/>
+          </a:lnRef>
+          <a:fillRef idx="3">
+            <a:schemeClr val="accent1"/>
+          </a:fillRef>
+          <a:effectRef idx="2">
+            <a:schemeClr val="accent1"/>
+          </a:effectRef>
+          <a:fontRef idx="minor">
+            <a:schemeClr val="lt1"/>
+          </a:fontRef>
+        </p:style>
+        <p:txBody>
+          <a:bodyPr rtlCol="0" anchor="ctr"/>
+          <a:lstStyle/>
+          <a:p>
+            <a:pPr algn="ctr"/>
+            <a:endParaRPr lang="en-US" sz="1600" dirty="0"/>
+          </a:p>
+        </p:txBody>
+      </p:sp>
+      <p:cxnSp>
+        <p:nvCxnSpPr>
+          <p:cNvPr id="37" name="Straight Arrow Connector 36">
+            <a:extLst>
+              <a:ext uri="{FF2B5EF4-FFF2-40B4-BE49-F238E27FC236}">
+                <a16:creationId xmlns:a16="http://schemas.microsoft.com/office/drawing/2014/main" id="{5149DB78-CDF0-F153-96CB-7B2522BFD642}"/>
+              </a:ext>
+            </a:extLst>
+          </p:cNvPr>
+          <p:cNvCxnSpPr>
+            <a:cxnSpLocks/>
+            <a:stCxn id="40" idx="3"/>
+            <a:endCxn id="65" idx="1"/>
+          </p:cNvCxnSpPr>
+          <p:nvPr/>
+        </p:nvCxnSpPr>
+        <p:spPr>
+          <a:xfrm>
+            <a:off x="3593502" y="4103757"/>
+            <a:ext cx="712032" cy="0"/>
+          </a:xfrm>
+          <a:prstGeom prst="straightConnector1">
+            <a:avLst/>
+          </a:prstGeom>
+          <a:ln>
+            <a:tailEnd type="triangle" w="lg" len="lg"/>
+          </a:ln>
+          <a:effectLst>
+            <a:outerShdw dist="20000" sx="1000" sy="1000" rotWithShape="0">
+              <a:srgbClr val="000000"/>
+            </a:outerShdw>
+          </a:effectLst>
+        </p:spPr>
+        <p:style>
+          <a:lnRef idx="2">
+            <a:schemeClr val="accent1"/>
+          </a:lnRef>
+          <a:fillRef idx="0">
+            <a:schemeClr val="accent1"/>
+          </a:fillRef>
+          <a:effectRef idx="1">
+            <a:schemeClr val="accent1"/>
+          </a:effectRef>
+          <a:fontRef idx="minor">
+            <a:schemeClr val="tx1"/>
+          </a:fontRef>
+        </p:style>
+      </p:cxnSp>
+      <p:cxnSp>
+        <p:nvCxnSpPr>
+          <p:cNvPr id="38" name="Straight Arrow Connector 37">
+            <a:extLst>
+              <a:ext uri="{FF2B5EF4-FFF2-40B4-BE49-F238E27FC236}">
+                <a16:creationId xmlns:a16="http://schemas.microsoft.com/office/drawing/2014/main" id="{3A4B4BD3-B6A9-AF99-20A3-A2EC7E675B1A}"/>
+              </a:ext>
+            </a:extLst>
+          </p:cNvPr>
+          <p:cNvCxnSpPr>
+            <a:cxnSpLocks/>
+            <a:stCxn id="39" idx="3"/>
+            <a:endCxn id="61" idx="2"/>
+          </p:cNvCxnSpPr>
+          <p:nvPr/>
+        </p:nvCxnSpPr>
+        <p:spPr>
+          <a:xfrm>
+            <a:off x="6592981" y="4038869"/>
+            <a:ext cx="597699" cy="3792"/>
+          </a:xfrm>
+          <a:prstGeom prst="straightConnector1">
+            <a:avLst/>
+          </a:prstGeom>
+          <a:ln>
+            <a:tailEnd type="triangle" w="lg" len="lg"/>
+          </a:ln>
+          <a:effectLst>
+            <a:outerShdw dist="20000" sx="1000" sy="1000" rotWithShape="0">
+              <a:srgbClr val="000000"/>
+            </a:outerShdw>
+          </a:effectLst>
+        </p:spPr>
+        <p:style>
+          <a:lnRef idx="2">
+            <a:schemeClr val="accent1"/>
+          </a:lnRef>
+          <a:fillRef idx="0">
+            <a:schemeClr val="accent1"/>
+          </a:fillRef>
+          <a:effectRef idx="1">
+            <a:schemeClr val="accent1"/>
+          </a:effectRef>
+          <a:fontRef idx="minor">
+            <a:schemeClr val="tx1"/>
+          </a:fontRef>
+        </p:style>
+      </p:cxnSp>
+      <mc:AlternateContent xmlns:mc="http://schemas.openxmlformats.org/markup-compatibility/2006">
+        <mc:Choice xmlns:a14="http://schemas.microsoft.com/office/drawing/2010/main" Requires="a14">
+          <p:sp>
+            <p:nvSpPr>
+              <p:cNvPr id="39" name="Rectangle 38">
+                <a:extLst>
+                  <a:ext uri="{FF2B5EF4-FFF2-40B4-BE49-F238E27FC236}">
+                    <a16:creationId xmlns:a16="http://schemas.microsoft.com/office/drawing/2014/main" id="{E11A246C-D12D-7449-5DB2-8A957BD0FCAC}"/>
+                  </a:ext>
+                </a:extLst>
+              </p:cNvPr>
+              <p:cNvSpPr/>
+              <p:nvPr/>
+            </p:nvSpPr>
+            <p:spPr>
+              <a:xfrm>
+                <a:off x="5880927" y="3884980"/>
+                <a:ext cx="712054" cy="307777"/>
+              </a:xfrm>
+              <a:prstGeom prst="rect">
+                <a:avLst/>
+              </a:prstGeom>
+            </p:spPr>
+            <p:txBody>
+              <a:bodyPr wrap="square">
+                <a:spAutoFit/>
+              </a:bodyPr>
+              <a:lstStyle/>
+              <a:p>
+                <a:pPr/>
+                <a14:m>
+                  <m:oMathPara xmlns:m="http://schemas.openxmlformats.org/officeDocument/2006/math">
+                    <m:oMathParaPr>
+                      <m:jc m:val="centerGroup"/>
+                    </m:oMathParaPr>
+                    <m:oMath xmlns:m="http://schemas.openxmlformats.org/officeDocument/2006/math">
+                      <m:r>
+                        <a:rPr lang="en-US" b="1" i="1" smtClean="0">
+                          <a:solidFill>
+                            <a:schemeClr val="bg1"/>
+                          </a:solidFill>
+                          <a:latin typeface="Cambria Math" panose="02040503050406030204" pitchFamily="18" charset="0"/>
+                        </a:rPr>
+                        <m:t>𝑶𝑳𝑺</m:t>
+                      </m:r>
+                    </m:oMath>
+                  </m:oMathPara>
+                </a14:m>
+                <a:endParaRPr lang="en-US" b="1" dirty="0">
+                  <a:solidFill>
+                    <a:schemeClr val="bg1"/>
+                  </a:solidFill>
+                </a:endParaRPr>
+              </a:p>
+            </p:txBody>
+          </p:sp>
+        </mc:Choice>
+        <mc:Fallback>
+          <p:sp>
+            <p:nvSpPr>
+              <p:cNvPr id="39" name="Rectangle 38">
+                <a:extLst>
+                  <a:ext uri="{FF2B5EF4-FFF2-40B4-BE49-F238E27FC236}">
+                    <a16:creationId xmlns:a16="http://schemas.microsoft.com/office/drawing/2014/main" id="{E11A246C-D12D-7449-5DB2-8A957BD0FCAC}"/>
+                  </a:ext>
+                </a:extLst>
+              </p:cNvPr>
+              <p:cNvSpPr>
+                <a:spLocks noRot="1" noChangeAspect="1" noMove="1" noResize="1" noEditPoints="1" noAdjustHandles="1" noChangeArrowheads="1" noChangeShapeType="1" noTextEdit="1"/>
+              </p:cNvSpPr>
+              <p:nvPr/>
+            </p:nvSpPr>
+            <p:spPr>
+              <a:xfrm>
+                <a:off x="5880927" y="3884980"/>
+                <a:ext cx="712054" cy="307777"/>
+              </a:xfrm>
+              <a:prstGeom prst="rect">
+                <a:avLst/>
+              </a:prstGeom>
+              <a:blipFill>
+                <a:blip r:embed="rId9"/>
+                <a:stretch>
+                  <a:fillRect/>
+                </a:stretch>
+              </a:blipFill>
+            </p:spPr>
+            <p:txBody>
+              <a:bodyPr/>
+              <a:lstStyle/>
+              <a:p>
+                <a:r>
+                  <a:rPr lang="en-US">
+                    <a:noFill/>
+                  </a:rPr>
+                  <a:t> </a:t>
+                </a:r>
+              </a:p>
+            </p:txBody>
+          </p:sp>
+        </mc:Fallback>
+      </mc:AlternateContent>
+      <p:sp>
+        <p:nvSpPr>
+          <p:cNvPr id="40" name="Rectangle 39">
+            <a:extLst>
+              <a:ext uri="{FF2B5EF4-FFF2-40B4-BE49-F238E27FC236}">
+                <a16:creationId xmlns:a16="http://schemas.microsoft.com/office/drawing/2014/main" id="{6D3717A6-1AC8-D195-BC3B-9B1704F1F33A}"/>
+              </a:ext>
+            </a:extLst>
+          </p:cNvPr>
+          <p:cNvSpPr>
+            <a:spLocks noChangeAspect="1"/>
+          </p:cNvSpPr>
+          <p:nvPr/>
+        </p:nvSpPr>
+        <p:spPr>
+          <a:xfrm>
+            <a:off x="2471611" y="3786282"/>
+            <a:ext cx="1121891" cy="634950"/>
+          </a:xfrm>
+          <a:prstGeom prst="rect">
+            <a:avLst/>
+          </a:prstGeom>
+        </p:spPr>
+        <p:style>
+          <a:lnRef idx="1">
+            <a:schemeClr val="accent1"/>
+          </a:lnRef>
+          <a:fillRef idx="3">
+            <a:schemeClr val="accent1"/>
+          </a:fillRef>
+          <a:effectRef idx="2">
+            <a:schemeClr val="accent1"/>
+          </a:effectRef>
+          <a:fontRef idx="minor">
+            <a:schemeClr val="lt1"/>
+          </a:fontRef>
+        </p:style>
+        <p:txBody>
+          <a:bodyPr rtlCol="0" anchor="ctr"/>
+          <a:lstStyle/>
+          <a:p>
+            <a:pPr algn="ctr"/>
+            <a:r>
+              <a:rPr lang="en-US" sz="1600" dirty="0"/>
+              <a:t>Controller</a:t>
+            </a:r>
+          </a:p>
+        </p:txBody>
+      </p:sp>
+      <p:cxnSp>
+        <p:nvCxnSpPr>
+          <p:cNvPr id="44" name="Straight Arrow Connector 43">
+            <a:extLst>
+              <a:ext uri="{FF2B5EF4-FFF2-40B4-BE49-F238E27FC236}">
+                <a16:creationId xmlns:a16="http://schemas.microsoft.com/office/drawing/2014/main" id="{206CC32E-B341-7F8B-9A16-28D7DE9AA650}"/>
+              </a:ext>
+            </a:extLst>
+          </p:cNvPr>
+          <p:cNvCxnSpPr>
+            <a:cxnSpLocks/>
+          </p:cNvCxnSpPr>
+          <p:nvPr/>
+        </p:nvCxnSpPr>
+        <p:spPr>
+          <a:xfrm flipV="1">
+            <a:off x="1116000" y="4134332"/>
+            <a:ext cx="644896" cy="3806"/>
+          </a:xfrm>
+          <a:prstGeom prst="straightConnector1">
+            <a:avLst/>
+          </a:prstGeom>
+          <a:ln>
+            <a:tailEnd type="triangle" w="lg" len="lg"/>
+          </a:ln>
+          <a:effectLst>
+            <a:outerShdw dist="20000" sx="1000" sy="1000" rotWithShape="0">
+              <a:srgbClr val="000000"/>
+            </a:outerShdw>
+          </a:effectLst>
+        </p:spPr>
+        <p:style>
+          <a:lnRef idx="2">
+            <a:schemeClr val="accent1"/>
+          </a:lnRef>
+          <a:fillRef idx="0">
+            <a:schemeClr val="accent1"/>
+          </a:fillRef>
+          <a:effectRef idx="1">
+            <a:schemeClr val="accent1"/>
+          </a:effectRef>
+          <a:fontRef idx="minor">
+            <a:schemeClr val="tx1"/>
+          </a:fontRef>
+        </p:style>
+      </p:cxnSp>
+      <p:sp>
+        <p:nvSpPr>
+          <p:cNvPr id="48" name="Oval 47">
+            <a:extLst>
+              <a:ext uri="{FF2B5EF4-FFF2-40B4-BE49-F238E27FC236}">
+                <a16:creationId xmlns:a16="http://schemas.microsoft.com/office/drawing/2014/main" id="{28D6D6BF-C1FB-D891-E594-43B97CE579B7}"/>
+              </a:ext>
+            </a:extLst>
+          </p:cNvPr>
+          <p:cNvSpPr/>
+          <p:nvPr/>
+        </p:nvSpPr>
+        <p:spPr>
+          <a:xfrm>
+            <a:off x="1780110" y="3961208"/>
+            <a:ext cx="301841" cy="301840"/>
+          </a:xfrm>
+          <a:prstGeom prst="ellipse">
+            <a:avLst/>
+          </a:prstGeom>
+        </p:spPr>
+        <p:style>
+          <a:lnRef idx="1">
+            <a:schemeClr val="accent1"/>
+          </a:lnRef>
+          <a:fillRef idx="3">
+            <a:schemeClr val="accent1"/>
+          </a:fillRef>
+          <a:effectRef idx="2">
+            <a:schemeClr val="accent1"/>
+          </a:effectRef>
+          <a:fontRef idx="minor">
+            <a:schemeClr val="lt1"/>
+          </a:fontRef>
+        </p:style>
+        <p:txBody>
+          <a:bodyPr rtlCol="0" anchor="ctr"/>
+          <a:lstStyle/>
+          <a:p>
+            <a:pPr algn="ctr"/>
+            <a:r>
+              <a:rPr lang="en-US" dirty="0"/>
+              <a:t>+</a:t>
+            </a:r>
+          </a:p>
+        </p:txBody>
+      </p:sp>
+      <p:cxnSp>
+        <p:nvCxnSpPr>
+          <p:cNvPr id="52" name="Straight Arrow Connector 51">
+            <a:extLst>
+              <a:ext uri="{FF2B5EF4-FFF2-40B4-BE49-F238E27FC236}">
+                <a16:creationId xmlns:a16="http://schemas.microsoft.com/office/drawing/2014/main" id="{91D450A8-3A6D-56B7-2794-CC016627790F}"/>
+              </a:ext>
+            </a:extLst>
+          </p:cNvPr>
+          <p:cNvCxnSpPr>
+            <a:cxnSpLocks/>
+            <a:stCxn id="48" idx="6"/>
+            <a:endCxn id="40" idx="1"/>
+          </p:cNvCxnSpPr>
+          <p:nvPr/>
+        </p:nvCxnSpPr>
+        <p:spPr>
+          <a:xfrm flipV="1">
+            <a:off x="2081951" y="4103757"/>
+            <a:ext cx="389660" cy="8371"/>
+          </a:xfrm>
+          <a:prstGeom prst="straightConnector1">
+            <a:avLst/>
+          </a:prstGeom>
+          <a:ln>
+            <a:tailEnd type="triangle" w="lg" len="lg"/>
+          </a:ln>
+          <a:effectLst>
+            <a:outerShdw dist="20000" sx="1000" sy="1000" rotWithShape="0">
+              <a:srgbClr val="000000"/>
+            </a:outerShdw>
+          </a:effectLst>
+        </p:spPr>
+        <p:style>
+          <a:lnRef idx="2">
+            <a:schemeClr val="accent1"/>
+          </a:lnRef>
+          <a:fillRef idx="0">
+            <a:schemeClr val="accent1"/>
+          </a:fillRef>
+          <a:effectRef idx="1">
+            <a:schemeClr val="accent1"/>
+          </a:effectRef>
+          <a:fontRef idx="minor">
+            <a:schemeClr val="tx1"/>
+          </a:fontRef>
+        </p:style>
+      </p:cxnSp>
+      <mc:AlternateContent xmlns:mc="http://schemas.openxmlformats.org/markup-compatibility/2006">
+        <mc:Choice xmlns:a14="http://schemas.microsoft.com/office/drawing/2010/main" Requires="a14">
+          <p:sp>
+            <p:nvSpPr>
+              <p:cNvPr id="53" name="TextBox 52">
+                <a:extLst>
+                  <a:ext uri="{FF2B5EF4-FFF2-40B4-BE49-F238E27FC236}">
+                    <a16:creationId xmlns:a16="http://schemas.microsoft.com/office/drawing/2014/main" id="{96ED0D9E-9668-8279-6C10-D85F42DD90A9}"/>
+                  </a:ext>
+                </a:extLst>
+              </p:cNvPr>
+              <p:cNvSpPr txBox="1"/>
+              <p:nvPr/>
+            </p:nvSpPr>
+            <p:spPr>
+              <a:xfrm>
+                <a:off x="1663521" y="4434791"/>
+                <a:ext cx="237244" cy="276999"/>
+              </a:xfrm>
+              <a:prstGeom prst="rect">
+                <a:avLst/>
+              </a:prstGeom>
+              <a:noFill/>
+            </p:spPr>
+            <p:txBody>
+              <a:bodyPr wrap="none" lIns="0" tIns="0" rIns="0" bIns="0" rtlCol="0">
+                <a:spAutoFit/>
+              </a:bodyPr>
+              <a:lstStyle/>
+              <a:p>
+                <a:pPr/>
+                <a14:m>
+                  <m:oMathPara xmlns:m="http://schemas.openxmlformats.org/officeDocument/2006/math">
+                    <m:oMathParaPr>
+                      <m:jc m:val="centerGroup"/>
+                    </m:oMathParaPr>
+                    <m:oMath xmlns:m="http://schemas.openxmlformats.org/officeDocument/2006/math">
+                      <m:r>
+                        <a:rPr lang="en-US" b="0" i="1" smtClean="0">
+                          <a:latin typeface="Cambria Math" panose="02040503050406030204" pitchFamily="18" charset="0"/>
+                        </a:rPr>
+                        <m:t>−</m:t>
+                      </m:r>
+                    </m:oMath>
+                  </m:oMathPara>
+                </a14:m>
+                <a:endParaRPr lang="en-US" dirty="0"/>
+              </a:p>
+            </p:txBody>
+          </p:sp>
+        </mc:Choice>
+        <mc:Fallback>
+          <p:sp>
+            <p:nvSpPr>
+              <p:cNvPr id="53" name="TextBox 52">
+                <a:extLst>
+                  <a:ext uri="{FF2B5EF4-FFF2-40B4-BE49-F238E27FC236}">
+                    <a16:creationId xmlns:a16="http://schemas.microsoft.com/office/drawing/2014/main" id="{96ED0D9E-9668-8279-6C10-D85F42DD90A9}"/>
+                  </a:ext>
+                </a:extLst>
+              </p:cNvPr>
+              <p:cNvSpPr txBox="1">
+                <a:spLocks noRot="1" noChangeAspect="1" noMove="1" noResize="1" noEditPoints="1" noAdjustHandles="1" noChangeArrowheads="1" noChangeShapeType="1" noTextEdit="1"/>
+              </p:cNvSpPr>
+              <p:nvPr/>
+            </p:nvSpPr>
+            <p:spPr>
+              <a:xfrm>
+                <a:off x="1663521" y="4434791"/>
+                <a:ext cx="237244" cy="276999"/>
+              </a:xfrm>
+              <a:prstGeom prst="rect">
+                <a:avLst/>
+              </a:prstGeom>
+              <a:blipFill>
+                <a:blip r:embed="rId10"/>
+                <a:stretch>
+                  <a:fillRect/>
+                </a:stretch>
+              </a:blipFill>
+            </p:spPr>
+            <p:txBody>
+              <a:bodyPr/>
+              <a:lstStyle/>
+              <a:p>
+                <a:r>
+                  <a:rPr lang="en-US">
+                    <a:noFill/>
+                  </a:rPr>
+                  <a:t> </a:t>
+                </a:r>
+              </a:p>
+            </p:txBody>
+          </p:sp>
+        </mc:Fallback>
+      </mc:AlternateContent>
+      <mc:AlternateContent xmlns:mc="http://schemas.openxmlformats.org/markup-compatibility/2006">
+        <mc:Choice xmlns:a14="http://schemas.microsoft.com/office/drawing/2010/main" Requires="a14">
+          <p:sp>
+            <p:nvSpPr>
+              <p:cNvPr id="54" name="Rectangle 53">
+                <a:extLst>
+                  <a:ext uri="{FF2B5EF4-FFF2-40B4-BE49-F238E27FC236}">
+                    <a16:creationId xmlns:a16="http://schemas.microsoft.com/office/drawing/2014/main" id="{5BFB4C37-8AB8-BBCA-85F0-D20A26F5239A}"/>
+                  </a:ext>
+                </a:extLst>
+              </p:cNvPr>
+              <p:cNvSpPr/>
+              <p:nvPr/>
+            </p:nvSpPr>
+            <p:spPr>
+              <a:xfrm>
+                <a:off x="1009687" y="3617519"/>
+                <a:ext cx="601318" cy="338554"/>
+              </a:xfrm>
+              <a:prstGeom prst="rect">
+                <a:avLst/>
+              </a:prstGeom>
+            </p:spPr>
+            <p:txBody>
+              <a:bodyPr wrap="none">
+                <a:spAutoFit/>
+              </a:bodyPr>
+              <a:lstStyle/>
+              <a:p>
+                <a:pPr/>
+                <a14:m>
+                  <m:oMathPara xmlns:m="http://schemas.openxmlformats.org/officeDocument/2006/math">
+                    <m:oMathParaPr>
+                      <m:jc m:val="centerGroup"/>
+                    </m:oMathParaPr>
+                    <m:oMath xmlns:m="http://schemas.openxmlformats.org/officeDocument/2006/math">
+                      <m:r>
+                        <a:rPr lang="en-US" sz="1600" b="0" i="1" smtClean="0">
+                          <a:solidFill>
+                            <a:schemeClr val="tx1"/>
+                          </a:solidFill>
+                          <a:latin typeface="Cambria Math" panose="02040503050406030204" pitchFamily="18" charset="0"/>
+                        </a:rPr>
+                        <m:t>𝑟</m:t>
+                      </m:r>
+                      <m:r>
+                        <a:rPr lang="en-US" sz="1600" b="0" i="1" smtClean="0">
+                          <a:solidFill>
+                            <a:schemeClr val="tx1"/>
+                          </a:solidFill>
+                          <a:latin typeface="Cambria Math" panose="02040503050406030204" pitchFamily="18" charset="0"/>
+                        </a:rPr>
+                        <m:t>(</m:t>
+                      </m:r>
+                      <m:r>
+                        <a:rPr lang="en-US" sz="1600" b="0" i="1" smtClean="0">
+                          <a:solidFill>
+                            <a:schemeClr val="tx1"/>
+                          </a:solidFill>
+                          <a:latin typeface="Cambria Math" panose="02040503050406030204" pitchFamily="18" charset="0"/>
+                        </a:rPr>
+                        <m:t>𝑡</m:t>
+                      </m:r>
+                      <m:r>
+                        <a:rPr lang="en-US" sz="1600" b="0" i="1" smtClean="0">
+                          <a:solidFill>
+                            <a:schemeClr val="tx1"/>
+                          </a:solidFill>
+                          <a:latin typeface="Cambria Math" panose="02040503050406030204" pitchFamily="18" charset="0"/>
+                        </a:rPr>
+                        <m:t>)</m:t>
+                      </m:r>
+                    </m:oMath>
+                  </m:oMathPara>
+                </a14:m>
+                <a:endParaRPr lang="en-US" sz="1600" dirty="0">
+                  <a:solidFill>
+                    <a:schemeClr val="tx1"/>
+                  </a:solidFill>
+                </a:endParaRPr>
+              </a:p>
+            </p:txBody>
+          </p:sp>
+        </mc:Choice>
+        <mc:Fallback>
+          <p:sp>
+            <p:nvSpPr>
+              <p:cNvPr id="54" name="Rectangle 53">
+                <a:extLst>
+                  <a:ext uri="{FF2B5EF4-FFF2-40B4-BE49-F238E27FC236}">
+                    <a16:creationId xmlns:a16="http://schemas.microsoft.com/office/drawing/2014/main" id="{5BFB4C37-8AB8-BBCA-85F0-D20A26F5239A}"/>
+                  </a:ext>
+                </a:extLst>
+              </p:cNvPr>
+              <p:cNvSpPr>
+                <a:spLocks noRot="1" noChangeAspect="1" noMove="1" noResize="1" noEditPoints="1" noAdjustHandles="1" noChangeArrowheads="1" noChangeShapeType="1" noTextEdit="1"/>
+              </p:cNvSpPr>
+              <p:nvPr/>
+            </p:nvSpPr>
+            <p:spPr>
+              <a:xfrm>
+                <a:off x="1009687" y="3617519"/>
+                <a:ext cx="601318" cy="338554"/>
+              </a:xfrm>
+              <a:prstGeom prst="rect">
+                <a:avLst/>
+              </a:prstGeom>
+              <a:blipFill>
+                <a:blip r:embed="rId11"/>
+                <a:stretch>
+                  <a:fillRect b="-17857"/>
+                </a:stretch>
+              </a:blipFill>
+            </p:spPr>
+            <p:txBody>
+              <a:bodyPr/>
+              <a:lstStyle/>
+              <a:p>
+                <a:r>
+                  <a:rPr lang="en-US">
+                    <a:noFill/>
+                  </a:rPr>
+                  <a:t> </a:t>
+                </a:r>
+              </a:p>
+            </p:txBody>
+          </p:sp>
+        </mc:Fallback>
+      </mc:AlternateContent>
+      <mc:AlternateContent xmlns:mc="http://schemas.openxmlformats.org/markup-compatibility/2006">
+        <mc:Choice xmlns:a14="http://schemas.microsoft.com/office/drawing/2010/main" Requires="a14">
+          <p:sp>
+            <p:nvSpPr>
+              <p:cNvPr id="55" name="Rectangle 54">
+                <a:extLst>
+                  <a:ext uri="{FF2B5EF4-FFF2-40B4-BE49-F238E27FC236}">
+                    <a16:creationId xmlns:a16="http://schemas.microsoft.com/office/drawing/2014/main" id="{FD444ADD-236C-D336-B074-4B2E2856137B}"/>
+                  </a:ext>
+                </a:extLst>
+              </p:cNvPr>
+              <p:cNvSpPr/>
+              <p:nvPr/>
+            </p:nvSpPr>
+            <p:spPr>
+              <a:xfrm>
+                <a:off x="1921908" y="3617519"/>
+                <a:ext cx="606127" cy="338554"/>
+              </a:xfrm>
+              <a:prstGeom prst="rect">
+                <a:avLst/>
+              </a:prstGeom>
+            </p:spPr>
+            <p:txBody>
+              <a:bodyPr wrap="none">
+                <a:spAutoFit/>
+              </a:bodyPr>
+              <a:lstStyle/>
+              <a:p>
+                <a:pPr/>
+                <a14:m>
+                  <m:oMathPara xmlns:m="http://schemas.openxmlformats.org/officeDocument/2006/math">
+                    <m:oMathParaPr>
+                      <m:jc m:val="centerGroup"/>
+                    </m:oMathParaPr>
+                    <m:oMath xmlns:m="http://schemas.openxmlformats.org/officeDocument/2006/math">
+                      <m:r>
+                        <a:rPr lang="en-US" sz="1600" b="0" i="1" smtClean="0">
+                          <a:solidFill>
+                            <a:schemeClr val="tx1"/>
+                          </a:solidFill>
+                          <a:latin typeface="Cambria Math" panose="02040503050406030204" pitchFamily="18" charset="0"/>
+                        </a:rPr>
+                        <m:t>𝑒</m:t>
+                      </m:r>
+                      <m:r>
+                        <a:rPr lang="en-US" sz="1600" b="0" i="1" smtClean="0">
+                          <a:solidFill>
+                            <a:schemeClr val="tx1"/>
+                          </a:solidFill>
+                          <a:latin typeface="Cambria Math" panose="02040503050406030204" pitchFamily="18" charset="0"/>
+                        </a:rPr>
+                        <m:t>(</m:t>
+                      </m:r>
+                      <m:r>
+                        <a:rPr lang="en-US" sz="1600" b="0" i="1" smtClean="0">
+                          <a:solidFill>
+                            <a:schemeClr val="tx1"/>
+                          </a:solidFill>
+                          <a:latin typeface="Cambria Math" panose="02040503050406030204" pitchFamily="18" charset="0"/>
+                        </a:rPr>
+                        <m:t>𝑡</m:t>
+                      </m:r>
+                      <m:r>
+                        <a:rPr lang="en-US" sz="1600" b="0" i="1" smtClean="0">
+                          <a:solidFill>
+                            <a:schemeClr val="tx1"/>
+                          </a:solidFill>
+                          <a:latin typeface="Cambria Math" panose="02040503050406030204" pitchFamily="18" charset="0"/>
+                        </a:rPr>
+                        <m:t>)</m:t>
+                      </m:r>
+                    </m:oMath>
+                  </m:oMathPara>
+                </a14:m>
+                <a:endParaRPr lang="en-US" sz="1600" dirty="0">
+                  <a:solidFill>
+                    <a:schemeClr val="tx1"/>
+                  </a:solidFill>
+                </a:endParaRPr>
+              </a:p>
+            </p:txBody>
+          </p:sp>
+        </mc:Choice>
+        <mc:Fallback>
+          <p:sp>
+            <p:nvSpPr>
+              <p:cNvPr id="55" name="Rectangle 54">
+                <a:extLst>
+                  <a:ext uri="{FF2B5EF4-FFF2-40B4-BE49-F238E27FC236}">
+                    <a16:creationId xmlns:a16="http://schemas.microsoft.com/office/drawing/2014/main" id="{FD444ADD-236C-D336-B074-4B2E2856137B}"/>
+                  </a:ext>
+                </a:extLst>
+              </p:cNvPr>
+              <p:cNvSpPr>
+                <a:spLocks noRot="1" noChangeAspect="1" noMove="1" noResize="1" noEditPoints="1" noAdjustHandles="1" noChangeArrowheads="1" noChangeShapeType="1" noTextEdit="1"/>
+              </p:cNvSpPr>
+              <p:nvPr/>
+            </p:nvSpPr>
+            <p:spPr>
+              <a:xfrm>
+                <a:off x="1921908" y="3617519"/>
+                <a:ext cx="606127" cy="338554"/>
+              </a:xfrm>
+              <a:prstGeom prst="rect">
+                <a:avLst/>
+              </a:prstGeom>
+              <a:blipFill>
+                <a:blip r:embed="rId12"/>
+                <a:stretch>
+                  <a:fillRect b="-17857"/>
+                </a:stretch>
+              </a:blipFill>
+            </p:spPr>
+            <p:txBody>
+              <a:bodyPr/>
+              <a:lstStyle/>
+              <a:p>
+                <a:r>
+                  <a:rPr lang="en-US">
+                    <a:noFill/>
+                  </a:rPr>
+                  <a:t> </a:t>
+                </a:r>
+              </a:p>
+            </p:txBody>
+          </p:sp>
+        </mc:Fallback>
+      </mc:AlternateContent>
+      <mc:AlternateContent xmlns:mc="http://schemas.openxmlformats.org/markup-compatibility/2006">
+        <mc:Choice xmlns:a14="http://schemas.microsoft.com/office/drawing/2010/main" Requires="a14">
+          <p:sp>
+            <p:nvSpPr>
+              <p:cNvPr id="56" name="Rectangle 55">
+                <a:extLst>
+                  <a:ext uri="{FF2B5EF4-FFF2-40B4-BE49-F238E27FC236}">
+                    <a16:creationId xmlns:a16="http://schemas.microsoft.com/office/drawing/2014/main" id="{F832155D-309B-5027-D80C-2EC7E9A9A8F0}"/>
+                  </a:ext>
+                </a:extLst>
+              </p:cNvPr>
+              <p:cNvSpPr/>
+              <p:nvPr/>
+            </p:nvSpPr>
+            <p:spPr>
+              <a:xfrm>
+                <a:off x="5275379" y="3617519"/>
+                <a:ext cx="716478" cy="338554"/>
+              </a:xfrm>
+              <a:prstGeom prst="rect">
+                <a:avLst/>
+              </a:prstGeom>
+            </p:spPr>
+            <p:txBody>
+              <a:bodyPr wrap="square">
+                <a:spAutoFit/>
+              </a:bodyPr>
+              <a:lstStyle/>
+              <a:p>
+                <a:pPr/>
+                <a14:m>
+                  <m:oMathPara xmlns:m="http://schemas.openxmlformats.org/officeDocument/2006/math">
+                    <m:oMathParaPr>
+                      <m:jc m:val="centerGroup"/>
+                    </m:oMathParaPr>
+                    <m:oMath xmlns:m="http://schemas.openxmlformats.org/officeDocument/2006/math">
+                      <m:r>
+                        <a:rPr lang="en-US" sz="1600" b="0" i="1" smtClean="0">
+                          <a:solidFill>
+                            <a:schemeClr val="tx1"/>
+                          </a:solidFill>
+                          <a:latin typeface="Cambria Math" panose="02040503050406030204" pitchFamily="18" charset="0"/>
+                        </a:rPr>
+                        <m:t>𝑢</m:t>
+                      </m:r>
+                      <m:r>
+                        <a:rPr lang="en-US" sz="1600" b="0" i="1" smtClean="0">
+                          <a:solidFill>
+                            <a:schemeClr val="tx1"/>
+                          </a:solidFill>
+                          <a:latin typeface="Cambria Math" panose="02040503050406030204" pitchFamily="18" charset="0"/>
+                        </a:rPr>
+                        <m:t>′(</m:t>
+                      </m:r>
+                      <m:r>
+                        <a:rPr lang="en-US" sz="1600" b="0" i="1" smtClean="0">
+                          <a:solidFill>
+                            <a:schemeClr val="tx1"/>
+                          </a:solidFill>
+                          <a:latin typeface="Cambria Math" panose="02040503050406030204" pitchFamily="18" charset="0"/>
+                        </a:rPr>
+                        <m:t>𝑡</m:t>
+                      </m:r>
+                      <m:r>
+                        <a:rPr lang="en-US" sz="1600" b="0" i="1" smtClean="0">
+                          <a:solidFill>
+                            <a:schemeClr val="tx1"/>
+                          </a:solidFill>
+                          <a:latin typeface="Cambria Math" panose="02040503050406030204" pitchFamily="18" charset="0"/>
+                        </a:rPr>
+                        <m:t>)</m:t>
+                      </m:r>
+                    </m:oMath>
+                  </m:oMathPara>
+                </a14:m>
+                <a:endParaRPr lang="en-US" sz="1600" dirty="0">
+                  <a:solidFill>
+                    <a:schemeClr val="tx1"/>
+                  </a:solidFill>
+                </a:endParaRPr>
+              </a:p>
+            </p:txBody>
+          </p:sp>
+        </mc:Choice>
+        <mc:Fallback>
+          <p:sp>
+            <p:nvSpPr>
+              <p:cNvPr id="56" name="Rectangle 55">
+                <a:extLst>
+                  <a:ext uri="{FF2B5EF4-FFF2-40B4-BE49-F238E27FC236}">
+                    <a16:creationId xmlns:a16="http://schemas.microsoft.com/office/drawing/2014/main" id="{F832155D-309B-5027-D80C-2EC7E9A9A8F0}"/>
+                  </a:ext>
+                </a:extLst>
+              </p:cNvPr>
+              <p:cNvSpPr>
+                <a:spLocks noRot="1" noChangeAspect="1" noMove="1" noResize="1" noEditPoints="1" noAdjustHandles="1" noChangeArrowheads="1" noChangeShapeType="1" noTextEdit="1"/>
+              </p:cNvSpPr>
+              <p:nvPr/>
+            </p:nvSpPr>
+            <p:spPr>
+              <a:xfrm>
+                <a:off x="5275379" y="3617519"/>
+                <a:ext cx="716478" cy="338554"/>
+              </a:xfrm>
+              <a:prstGeom prst="rect">
+                <a:avLst/>
+              </a:prstGeom>
+              <a:blipFill>
+                <a:blip r:embed="rId13"/>
+                <a:stretch>
+                  <a:fillRect b="-17857"/>
+                </a:stretch>
+              </a:blipFill>
+            </p:spPr>
+            <p:txBody>
+              <a:bodyPr/>
+              <a:lstStyle/>
+              <a:p>
+                <a:r>
+                  <a:rPr lang="en-US">
+                    <a:noFill/>
+                  </a:rPr>
+                  <a:t> </a:t>
+                </a:r>
+              </a:p>
+            </p:txBody>
+          </p:sp>
+        </mc:Fallback>
+      </mc:AlternateContent>
+      <mc:AlternateContent xmlns:mc="http://schemas.openxmlformats.org/markup-compatibility/2006">
+        <mc:Choice xmlns:a14="http://schemas.microsoft.com/office/drawing/2010/main" Requires="a14">
+          <p:sp>
+            <p:nvSpPr>
+              <p:cNvPr id="60" name="Rectangle 59">
+                <a:extLst>
+                  <a:ext uri="{FF2B5EF4-FFF2-40B4-BE49-F238E27FC236}">
+                    <a16:creationId xmlns:a16="http://schemas.microsoft.com/office/drawing/2014/main" id="{561A4583-AD2B-8CA2-0560-841494AF6856}"/>
+                  </a:ext>
+                </a:extLst>
+              </p:cNvPr>
+              <p:cNvSpPr/>
+              <p:nvPr/>
+            </p:nvSpPr>
+            <p:spPr>
+              <a:xfrm>
+                <a:off x="6527596" y="3617519"/>
+                <a:ext cx="716478" cy="338554"/>
+              </a:xfrm>
+              <a:prstGeom prst="rect">
+                <a:avLst/>
+              </a:prstGeom>
+            </p:spPr>
+            <p:txBody>
+              <a:bodyPr wrap="square">
+                <a:spAutoFit/>
+              </a:bodyPr>
+              <a:lstStyle/>
+              <a:p>
+                <a:pPr/>
+                <a14:m>
+                  <m:oMathPara xmlns:m="http://schemas.openxmlformats.org/officeDocument/2006/math">
+                    <m:oMathParaPr>
+                      <m:jc m:val="centerGroup"/>
+                    </m:oMathParaPr>
+                    <m:oMath xmlns:m="http://schemas.openxmlformats.org/officeDocument/2006/math">
+                      <m:r>
+                        <a:rPr lang="en-US" sz="1600" b="0" i="1" smtClean="0">
+                          <a:solidFill>
+                            <a:schemeClr val="tx1"/>
+                          </a:solidFill>
+                          <a:latin typeface="Cambria Math" panose="02040503050406030204" pitchFamily="18" charset="0"/>
+                        </a:rPr>
+                        <m:t>𝑦</m:t>
+                      </m:r>
+                      <m:r>
+                        <a:rPr lang="en-US" sz="1600" b="0" i="1" smtClean="0">
+                          <a:solidFill>
+                            <a:schemeClr val="tx1"/>
+                          </a:solidFill>
+                          <a:latin typeface="Cambria Math" panose="02040503050406030204" pitchFamily="18" charset="0"/>
+                        </a:rPr>
+                        <m:t>(</m:t>
+                      </m:r>
+                      <m:r>
+                        <a:rPr lang="en-US" sz="1600" b="0" i="1" smtClean="0">
+                          <a:solidFill>
+                            <a:schemeClr val="tx1"/>
+                          </a:solidFill>
+                          <a:latin typeface="Cambria Math" panose="02040503050406030204" pitchFamily="18" charset="0"/>
+                        </a:rPr>
+                        <m:t>𝑡</m:t>
+                      </m:r>
+                      <m:r>
+                        <a:rPr lang="en-US" sz="1600" b="0" i="1" smtClean="0">
+                          <a:solidFill>
+                            <a:schemeClr val="tx1"/>
+                          </a:solidFill>
+                          <a:latin typeface="Cambria Math" panose="02040503050406030204" pitchFamily="18" charset="0"/>
+                        </a:rPr>
+                        <m:t>)</m:t>
+                      </m:r>
+                    </m:oMath>
+                  </m:oMathPara>
+                </a14:m>
+                <a:endParaRPr lang="en-US" sz="1600" dirty="0">
+                  <a:solidFill>
+                    <a:schemeClr val="tx1"/>
+                  </a:solidFill>
+                </a:endParaRPr>
+              </a:p>
+            </p:txBody>
+          </p:sp>
+        </mc:Choice>
+        <mc:Fallback>
+          <p:sp>
+            <p:nvSpPr>
+              <p:cNvPr id="60" name="Rectangle 59">
+                <a:extLst>
+                  <a:ext uri="{FF2B5EF4-FFF2-40B4-BE49-F238E27FC236}">
+                    <a16:creationId xmlns:a16="http://schemas.microsoft.com/office/drawing/2014/main" id="{561A4583-AD2B-8CA2-0560-841494AF6856}"/>
+                  </a:ext>
+                </a:extLst>
+              </p:cNvPr>
+              <p:cNvSpPr>
+                <a:spLocks noRot="1" noChangeAspect="1" noMove="1" noResize="1" noEditPoints="1" noAdjustHandles="1" noChangeArrowheads="1" noChangeShapeType="1" noTextEdit="1"/>
+              </p:cNvSpPr>
+              <p:nvPr/>
+            </p:nvSpPr>
+            <p:spPr>
+              <a:xfrm>
+                <a:off x="6527596" y="3617519"/>
+                <a:ext cx="716478" cy="338554"/>
+              </a:xfrm>
+              <a:prstGeom prst="rect">
+                <a:avLst/>
+              </a:prstGeom>
+              <a:blipFill>
+                <a:blip r:embed="rId14"/>
+                <a:stretch>
+                  <a:fillRect b="-17857"/>
+                </a:stretch>
+              </a:blipFill>
+            </p:spPr>
+            <p:txBody>
+              <a:bodyPr/>
+              <a:lstStyle/>
+              <a:p>
+                <a:r>
+                  <a:rPr lang="en-US">
+                    <a:noFill/>
+                  </a:rPr>
+                  <a:t> </a:t>
+                </a:r>
+              </a:p>
+            </p:txBody>
+          </p:sp>
+        </mc:Fallback>
+      </mc:AlternateContent>
+      <p:sp>
+        <p:nvSpPr>
+          <p:cNvPr id="61" name="Oval 60">
+            <a:extLst>
+              <a:ext uri="{FF2B5EF4-FFF2-40B4-BE49-F238E27FC236}">
+                <a16:creationId xmlns:a16="http://schemas.microsoft.com/office/drawing/2014/main" id="{0BEA2F02-EBEC-2A3B-B7D3-BD7064CE653F}"/>
+              </a:ext>
+            </a:extLst>
+          </p:cNvPr>
+          <p:cNvSpPr>
+            <a:spLocks noChangeAspect="1"/>
+          </p:cNvSpPr>
+          <p:nvPr/>
+        </p:nvSpPr>
+        <p:spPr>
+          <a:xfrm>
+            <a:off x="7190680" y="3996941"/>
+            <a:ext cx="91440" cy="91440"/>
+          </a:xfrm>
+          <a:prstGeom prst="ellipse">
+            <a:avLst/>
+          </a:prstGeom>
+        </p:spPr>
+        <p:style>
+          <a:lnRef idx="1">
+            <a:schemeClr val="accent1"/>
+          </a:lnRef>
+          <a:fillRef idx="3">
+            <a:schemeClr val="accent1"/>
+          </a:fillRef>
+          <a:effectRef idx="2">
+            <a:schemeClr val="accent1"/>
+          </a:effectRef>
+          <a:fontRef idx="minor">
+            <a:schemeClr val="lt1"/>
+          </a:fontRef>
+        </p:style>
+        <p:txBody>
+          <a:bodyPr rtlCol="0" anchor="ctr"/>
+          <a:lstStyle/>
+          <a:p>
+            <a:pPr algn="ctr"/>
+            <a:endParaRPr lang="en-US" dirty="0"/>
+          </a:p>
+        </p:txBody>
+      </p:sp>
+      <p:cxnSp>
+        <p:nvCxnSpPr>
+          <p:cNvPr id="62" name="Straight Arrow Connector 61">
+            <a:extLst>
+              <a:ext uri="{FF2B5EF4-FFF2-40B4-BE49-F238E27FC236}">
+                <a16:creationId xmlns:a16="http://schemas.microsoft.com/office/drawing/2014/main" id="{DBEF6C9F-0534-61B0-0CC4-7F483E2CEA81}"/>
+              </a:ext>
+            </a:extLst>
+          </p:cNvPr>
+          <p:cNvCxnSpPr>
+            <a:cxnSpLocks/>
+            <a:stCxn id="61" idx="6"/>
+          </p:cNvCxnSpPr>
+          <p:nvPr/>
+        </p:nvCxnSpPr>
+        <p:spPr>
+          <a:xfrm>
+            <a:off x="7282120" y="4042661"/>
+            <a:ext cx="679510" cy="0"/>
+          </a:xfrm>
+          <a:prstGeom prst="straightConnector1">
+            <a:avLst/>
+          </a:prstGeom>
+          <a:ln>
+            <a:tailEnd type="triangle" w="lg" len="lg"/>
+          </a:ln>
+          <a:effectLst>
+            <a:outerShdw dist="20000" sx="1000" sy="1000" rotWithShape="0">
+              <a:srgbClr val="000000"/>
+            </a:outerShdw>
+          </a:effectLst>
+        </p:spPr>
+        <p:style>
+          <a:lnRef idx="2">
+            <a:schemeClr val="accent1"/>
+          </a:lnRef>
+          <a:fillRef idx="0">
+            <a:schemeClr val="accent1"/>
+          </a:fillRef>
+          <a:effectRef idx="1">
+            <a:schemeClr val="accent1"/>
+          </a:effectRef>
+          <a:fontRef idx="minor">
+            <a:schemeClr val="tx1"/>
+          </a:fontRef>
+        </p:style>
+      </p:cxnSp>
+      <p:cxnSp>
+        <p:nvCxnSpPr>
+          <p:cNvPr id="63" name="Elbow Connector 62">
+            <a:extLst>
+              <a:ext uri="{FF2B5EF4-FFF2-40B4-BE49-F238E27FC236}">
+                <a16:creationId xmlns:a16="http://schemas.microsoft.com/office/drawing/2014/main" id="{38D606A2-C751-6C6F-6802-E5B6586E643E}"/>
+              </a:ext>
+            </a:extLst>
+          </p:cNvPr>
+          <p:cNvCxnSpPr>
+            <a:cxnSpLocks/>
+            <a:stCxn id="61" idx="4"/>
+            <a:endCxn id="48" idx="4"/>
+          </p:cNvCxnSpPr>
+          <p:nvPr/>
+        </p:nvCxnSpPr>
+        <p:spPr>
+          <a:xfrm rot="5400000">
+            <a:off x="4496383" y="1523030"/>
+            <a:ext cx="174667" cy="5305369"/>
+          </a:xfrm>
+          <a:prstGeom prst="bentConnector3">
+            <a:avLst>
+              <a:gd name="adj1" fmla="val 326062"/>
+            </a:avLst>
+          </a:prstGeom>
+          <a:ln w="19050">
+            <a:tailEnd type="triangle" w="lg" len="lg"/>
+          </a:ln>
+          <a:effectLst>
+            <a:outerShdw dist="20000" sx="1000" sy="1000" rotWithShape="0">
+              <a:srgbClr val="000000"/>
+            </a:outerShdw>
+          </a:effectLst>
+        </p:spPr>
+        <p:style>
+          <a:lnRef idx="2">
+            <a:schemeClr val="accent1"/>
+          </a:lnRef>
+          <a:fillRef idx="0">
+            <a:schemeClr val="accent1"/>
+          </a:fillRef>
+          <a:effectRef idx="1">
+            <a:schemeClr val="accent1"/>
+          </a:effectRef>
+          <a:fontRef idx="minor">
+            <a:schemeClr val="tx1"/>
+          </a:fontRef>
+        </p:style>
+      </p:cxnSp>
+      <p:sp>
+        <p:nvSpPr>
+          <p:cNvPr id="65" name="Rectangle 64">
+            <a:extLst>
+              <a:ext uri="{FF2B5EF4-FFF2-40B4-BE49-F238E27FC236}">
+                <a16:creationId xmlns:a16="http://schemas.microsoft.com/office/drawing/2014/main" id="{0ED41751-E5D6-FAD4-927A-53D44D72348E}"/>
+              </a:ext>
+            </a:extLst>
+          </p:cNvPr>
+          <p:cNvSpPr>
+            <a:spLocks noChangeAspect="1"/>
+          </p:cNvSpPr>
+          <p:nvPr/>
+        </p:nvSpPr>
+        <p:spPr>
+          <a:xfrm>
+            <a:off x="4305534" y="3786282"/>
+            <a:ext cx="1010537" cy="634949"/>
+          </a:xfrm>
+          <a:prstGeom prst="rect">
+            <a:avLst/>
+          </a:prstGeom>
+        </p:spPr>
+        <p:style>
+          <a:lnRef idx="1">
+            <a:schemeClr val="accent1"/>
+          </a:lnRef>
+          <a:fillRef idx="3">
+            <a:schemeClr val="accent1"/>
+          </a:fillRef>
+          <a:effectRef idx="2">
+            <a:schemeClr val="accent1"/>
+          </a:effectRef>
+          <a:fontRef idx="minor">
+            <a:schemeClr val="lt1"/>
+          </a:fontRef>
+        </p:style>
+        <p:txBody>
+          <a:bodyPr rtlCol="0" anchor="ctr"/>
+          <a:lstStyle/>
+          <a:p>
+            <a:pPr algn="ctr"/>
+            <a:r>
+              <a:rPr lang="en-US" sz="1600" dirty="0" err="1"/>
+              <a:t>Flakifier</a:t>
+            </a:r>
+            <a:endParaRPr lang="en-US" sz="1600" dirty="0"/>
+          </a:p>
+        </p:txBody>
+      </p:sp>
+      <p:cxnSp>
+        <p:nvCxnSpPr>
+          <p:cNvPr id="69" name="Straight Arrow Connector 68">
+            <a:extLst>
+              <a:ext uri="{FF2B5EF4-FFF2-40B4-BE49-F238E27FC236}">
+                <a16:creationId xmlns:a16="http://schemas.microsoft.com/office/drawing/2014/main" id="{1D19941F-ECE9-77BB-3BBD-CC0CF53B5E30}"/>
+              </a:ext>
+            </a:extLst>
+          </p:cNvPr>
+          <p:cNvCxnSpPr>
+            <a:cxnSpLocks/>
+            <a:stCxn id="65" idx="3"/>
+            <a:endCxn id="36" idx="1"/>
+          </p:cNvCxnSpPr>
+          <p:nvPr/>
+        </p:nvCxnSpPr>
+        <p:spPr>
+          <a:xfrm>
+            <a:off x="5316071" y="4103757"/>
+            <a:ext cx="619578" cy="8547"/>
+          </a:xfrm>
+          <a:prstGeom prst="straightConnector1">
+            <a:avLst/>
+          </a:prstGeom>
+          <a:ln>
+            <a:tailEnd type="triangle" w="lg" len="lg"/>
+          </a:ln>
+          <a:effectLst>
+            <a:outerShdw dist="20000" sx="1000" sy="1000" rotWithShape="0">
+              <a:srgbClr val="000000"/>
+            </a:outerShdw>
+          </a:effectLst>
+        </p:spPr>
+        <p:style>
+          <a:lnRef idx="2">
+            <a:schemeClr val="accent1"/>
+          </a:lnRef>
+          <a:fillRef idx="0">
+            <a:schemeClr val="accent1"/>
+          </a:fillRef>
+          <a:effectRef idx="1">
+            <a:schemeClr val="accent1"/>
+          </a:effectRef>
+          <a:fontRef idx="minor">
+            <a:schemeClr val="tx1"/>
+          </a:fontRef>
+        </p:style>
+      </p:cxnSp>
+      <mc:AlternateContent xmlns:mc="http://schemas.openxmlformats.org/markup-compatibility/2006">
+        <mc:Choice xmlns:a14="http://schemas.microsoft.com/office/drawing/2010/main" Requires="a14">
+          <p:sp>
+            <p:nvSpPr>
+              <p:cNvPr id="71" name="Rectangle 70">
+                <a:extLst>
+                  <a:ext uri="{FF2B5EF4-FFF2-40B4-BE49-F238E27FC236}">
+                    <a16:creationId xmlns:a16="http://schemas.microsoft.com/office/drawing/2014/main" id="{4C331B96-1683-17AB-5351-6689D9B4EF6C}"/>
+                  </a:ext>
+                </a:extLst>
+              </p:cNvPr>
+              <p:cNvSpPr/>
+              <p:nvPr/>
+            </p:nvSpPr>
+            <p:spPr>
+              <a:xfrm>
+                <a:off x="3640674" y="3617519"/>
+                <a:ext cx="716478" cy="338554"/>
+              </a:xfrm>
+              <a:prstGeom prst="rect">
+                <a:avLst/>
+              </a:prstGeom>
+            </p:spPr>
+            <p:txBody>
+              <a:bodyPr wrap="square">
+                <a:spAutoFit/>
+              </a:bodyPr>
+              <a:lstStyle/>
+              <a:p>
+                <a:pPr/>
+                <a14:m>
+                  <m:oMathPara xmlns:m="http://schemas.openxmlformats.org/officeDocument/2006/math">
+                    <m:oMathParaPr>
+                      <m:jc m:val="centerGroup"/>
+                    </m:oMathParaPr>
+                    <m:oMath xmlns:m="http://schemas.openxmlformats.org/officeDocument/2006/math">
+                      <m:r>
+                        <a:rPr lang="en-US" sz="1600" b="0" i="1" smtClean="0">
+                          <a:solidFill>
+                            <a:schemeClr val="tx1"/>
+                          </a:solidFill>
+                          <a:latin typeface="Cambria Math" panose="02040503050406030204" pitchFamily="18" charset="0"/>
+                        </a:rPr>
+                        <m:t>𝑢</m:t>
+                      </m:r>
+                      <m:r>
+                        <a:rPr lang="en-US" sz="1600" b="0" i="1" smtClean="0">
+                          <a:solidFill>
+                            <a:schemeClr val="tx1"/>
+                          </a:solidFill>
+                          <a:latin typeface="Cambria Math" panose="02040503050406030204" pitchFamily="18" charset="0"/>
+                        </a:rPr>
+                        <m:t>(</m:t>
+                      </m:r>
+                      <m:r>
+                        <a:rPr lang="en-US" sz="1600" b="0" i="1" smtClean="0">
+                          <a:solidFill>
+                            <a:schemeClr val="tx1"/>
+                          </a:solidFill>
+                          <a:latin typeface="Cambria Math" panose="02040503050406030204" pitchFamily="18" charset="0"/>
+                        </a:rPr>
+                        <m:t>𝑡</m:t>
+                      </m:r>
+                      <m:r>
+                        <a:rPr lang="en-US" sz="1600" b="0" i="1" smtClean="0">
+                          <a:solidFill>
+                            <a:schemeClr val="tx1"/>
+                          </a:solidFill>
+                          <a:latin typeface="Cambria Math" panose="02040503050406030204" pitchFamily="18" charset="0"/>
+                        </a:rPr>
+                        <m:t>)</m:t>
+                      </m:r>
+                    </m:oMath>
+                  </m:oMathPara>
+                </a14:m>
+                <a:endParaRPr lang="en-US" sz="1600" dirty="0">
+                  <a:solidFill>
+                    <a:schemeClr val="tx1"/>
+                  </a:solidFill>
+                </a:endParaRPr>
+              </a:p>
+            </p:txBody>
+          </p:sp>
+        </mc:Choice>
+        <mc:Fallback>
+          <p:sp>
+            <p:nvSpPr>
+              <p:cNvPr id="71" name="Rectangle 70">
+                <a:extLst>
+                  <a:ext uri="{FF2B5EF4-FFF2-40B4-BE49-F238E27FC236}">
+                    <a16:creationId xmlns:a16="http://schemas.microsoft.com/office/drawing/2014/main" id="{4C331B96-1683-17AB-5351-6689D9B4EF6C}"/>
+                  </a:ext>
+                </a:extLst>
+              </p:cNvPr>
+              <p:cNvSpPr>
+                <a:spLocks noRot="1" noChangeAspect="1" noMove="1" noResize="1" noEditPoints="1" noAdjustHandles="1" noChangeArrowheads="1" noChangeShapeType="1" noTextEdit="1"/>
+              </p:cNvSpPr>
+              <p:nvPr/>
+            </p:nvSpPr>
+            <p:spPr>
+              <a:xfrm>
+                <a:off x="3640674" y="3617519"/>
+                <a:ext cx="716478" cy="338554"/>
+              </a:xfrm>
+              <a:prstGeom prst="rect">
+                <a:avLst/>
+              </a:prstGeom>
+              <a:blipFill>
+                <a:blip r:embed="rId15"/>
+                <a:stretch>
+                  <a:fillRect b="-17857"/>
+                </a:stretch>
+              </a:blipFill>
+            </p:spPr>
+            <p:txBody>
+              <a:bodyPr/>
+              <a:lstStyle/>
+              <a:p>
+                <a:r>
+                  <a:rPr lang="en-US">
+                    <a:noFill/>
+                  </a:rPr>
+                  <a:t> </a:t>
+                </a:r>
+              </a:p>
+            </p:txBody>
+          </p:sp>
+        </mc:Fallback>
+      </mc:AlternateContent>
+      <p:sp>
+        <p:nvSpPr>
+          <p:cNvPr id="76" name="TextBox 75">
+            <a:extLst>
+              <a:ext uri="{FF2B5EF4-FFF2-40B4-BE49-F238E27FC236}">
+                <a16:creationId xmlns:a16="http://schemas.microsoft.com/office/drawing/2014/main" id="{FCC91FC0-23C6-B094-3CE2-1D51ABCFD262}"/>
+              </a:ext>
+            </a:extLst>
+          </p:cNvPr>
+          <p:cNvSpPr txBox="1"/>
+          <p:nvPr/>
+        </p:nvSpPr>
+        <p:spPr>
+          <a:xfrm>
+            <a:off x="1056488" y="1521235"/>
+            <a:ext cx="960519" cy="307777"/>
+          </a:xfrm>
+          <a:prstGeom prst="rect">
+            <a:avLst/>
+          </a:prstGeom>
+          <a:noFill/>
+        </p:spPr>
+        <p:txBody>
+          <a:bodyPr wrap="none" rtlCol="0">
+            <a:spAutoFit/>
+          </a:bodyPr>
+          <a:lstStyle/>
+          <a:p>
+            <a:r>
+              <a:rPr lang="en-US" b="1" dirty="0"/>
+              <a:t>(a) CLS 1</a:t>
+            </a:r>
+          </a:p>
+        </p:txBody>
+      </p:sp>
+      <p:sp>
+        <p:nvSpPr>
+          <p:cNvPr id="77" name="TextBox 76">
+            <a:extLst>
+              <a:ext uri="{FF2B5EF4-FFF2-40B4-BE49-F238E27FC236}">
+                <a16:creationId xmlns:a16="http://schemas.microsoft.com/office/drawing/2014/main" id="{7A20F4B0-81AB-12DC-5413-0ED44464BC89}"/>
+              </a:ext>
+            </a:extLst>
+          </p:cNvPr>
+          <p:cNvSpPr txBox="1"/>
+          <p:nvPr/>
+        </p:nvSpPr>
+        <p:spPr>
+          <a:xfrm>
+            <a:off x="1056488" y="3299039"/>
+            <a:ext cx="970137" cy="307777"/>
+          </a:xfrm>
+          <a:prstGeom prst="rect">
+            <a:avLst/>
+          </a:prstGeom>
+          <a:noFill/>
+        </p:spPr>
+        <p:txBody>
+          <a:bodyPr wrap="none" rtlCol="0">
+            <a:spAutoFit/>
+          </a:bodyPr>
+          <a:lstStyle/>
+          <a:p>
+            <a:r>
+              <a:rPr lang="en-US" b="1" dirty="0"/>
+              <a:t>(b) CLS 2</a:t>
+            </a:r>
+          </a:p>
+        </p:txBody>
+      </p:sp>
+    </p:spTree>
+    <p:extLst>
+      <p:ext uri="{BB962C8B-B14F-4D97-AF65-F5344CB8AC3E}">
+        <p14:creationId xmlns:p14="http://schemas.microsoft.com/office/powerpoint/2010/main" val="3702702469"/>
       </p:ext>
     </p:extLst>
   </p:cSld>

</xml_diff>